<commit_message>
Added graphic to slides
</commit_message>
<xml_diff>
--- a/20180802 Capstone Presentation.pptx
+++ b/20180802 Capstone Presentation.pptx
@@ -5,10 +5,10 @@
     <p:sldMasterId id="2147483793" r:id="rId1"/>
   </p:sldMasterIdLst>
   <p:notesMasterIdLst>
-    <p:notesMasterId r:id="rId13"/>
+    <p:notesMasterId r:id="rId15"/>
   </p:notesMasterIdLst>
   <p:handoutMasterIdLst>
-    <p:handoutMasterId r:id="rId14"/>
+    <p:handoutMasterId r:id="rId16"/>
   </p:handoutMasterIdLst>
   <p:sldIdLst>
     <p:sldId id="309" r:id="rId2"/>
@@ -16,12 +16,14 @@
     <p:sldId id="301" r:id="rId4"/>
     <p:sldId id="307" r:id="rId5"/>
     <p:sldId id="311" r:id="rId6"/>
-    <p:sldId id="310" r:id="rId7"/>
-    <p:sldId id="312" r:id="rId8"/>
-    <p:sldId id="313" r:id="rId9"/>
-    <p:sldId id="315" r:id="rId10"/>
-    <p:sldId id="314" r:id="rId11"/>
-    <p:sldId id="308" r:id="rId12"/>
+    <p:sldId id="316" r:id="rId7"/>
+    <p:sldId id="317" r:id="rId8"/>
+    <p:sldId id="310" r:id="rId9"/>
+    <p:sldId id="312" r:id="rId10"/>
+    <p:sldId id="313" r:id="rId11"/>
+    <p:sldId id="315" r:id="rId12"/>
+    <p:sldId id="314" r:id="rId13"/>
+    <p:sldId id="308" r:id="rId14"/>
   </p:sldIdLst>
   <p:sldSz cx="9144000" cy="6858000" type="screen4x3"/>
   <p:notesSz cx="6858000" cy="9144000"/>
@@ -350,11 +352,11 @@
           <c:showBubbleSize val="0"/>
         </c:dLbls>
         <c:gapWidth val="150"/>
-        <c:axId val="441181760"/>
-        <c:axId val="441178624"/>
+        <c:axId val="378443312"/>
+        <c:axId val="378437040"/>
       </c:barChart>
       <c:catAx>
-        <c:axId val="441181760"/>
+        <c:axId val="378443312"/>
         <c:scaling>
           <c:orientation val="minMax"/>
         </c:scaling>
@@ -364,7 +366,7 @@
         <c:majorTickMark val="out"/>
         <c:minorTickMark val="none"/>
         <c:tickLblPos val="nextTo"/>
-        <c:crossAx val="441178624"/>
+        <c:crossAx val="378437040"/>
         <c:crosses val="autoZero"/>
         <c:auto val="1"/>
         <c:lblAlgn val="ctr"/>
@@ -372,7 +374,7 @@
         <c:noMultiLvlLbl val="0"/>
       </c:catAx>
       <c:valAx>
-        <c:axId val="441178624"/>
+        <c:axId val="378437040"/>
         <c:scaling>
           <c:orientation val="minMax"/>
         </c:scaling>
@@ -383,7 +385,7 @@
         <c:majorTickMark val="out"/>
         <c:minorTickMark val="none"/>
         <c:tickLblPos val="nextTo"/>
-        <c:crossAx val="441181760"/>
+        <c:crossAx val="378443312"/>
         <c:crosses val="autoZero"/>
         <c:crossBetween val="between"/>
       </c:valAx>
@@ -2242,15 +2244,7 @@
                 <a:schemeClr val="tx1"/>
               </a:solidFill>
             </a:rPr>
-            <a:t>Create </a:t>
-          </a:r>
-          <a:r>
-            <a:rPr lang="en-US" baseline="0" dirty="0" smtClean="0">
-              <a:solidFill>
-                <a:schemeClr val="tx1"/>
-              </a:solidFill>
-            </a:rPr>
-            <a:t>dataset</a:t>
+            <a:t>Create dataset</a:t>
           </a:r>
           <a:endParaRPr lang="en-US" baseline="0" dirty="0">
             <a:solidFill>
@@ -2430,11 +2424,7 @@
         <a:p>
           <a:r>
             <a:rPr lang="en-US" dirty="0" smtClean="0"/>
-            <a:t>Test clusters </a:t>
-          </a:r>
-          <a:r>
-            <a:rPr lang="en-US" dirty="0" smtClean="0"/>
-            <a:t>with existing categories</a:t>
+            <a:t>Test clusters with existing categories</a:t>
           </a:r>
           <a:endParaRPr lang="en-US" dirty="0"/>
         </a:p>
@@ -2872,1056 +2862,6 @@
       <dsp:cNvGrpSpPr/>
     </dsp:nvGrpSpPr>
     <dsp:grpSpPr/>
-    <dsp:sp modelId="{DFC0E9AC-9B82-41F1-BDE4-093D70DFCBCF}">
-      <dsp:nvSpPr>
-        <dsp:cNvPr id="0" name=""/>
-        <dsp:cNvSpPr/>
-      </dsp:nvSpPr>
-      <dsp:spPr>
-        <a:xfrm>
-          <a:off x="2590564" y="581522"/>
-          <a:ext cx="449071" cy="91440"/>
-        </a:xfrm>
-        <a:custGeom>
-          <a:avLst/>
-          <a:gdLst/>
-          <a:ahLst/>
-          <a:cxnLst/>
-          <a:rect l="0" t="0" r="0" b="0"/>
-          <a:pathLst>
-            <a:path>
-              <a:moveTo>
-                <a:pt x="0" y="45720"/>
-              </a:moveTo>
-              <a:lnTo>
-                <a:pt x="449071" y="45720"/>
-              </a:lnTo>
-            </a:path>
-          </a:pathLst>
-        </a:custGeom>
-        <a:noFill/>
-        <a:ln w="6350" cap="rnd" cmpd="sng" algn="ctr">
-          <a:solidFill>
-            <a:schemeClr val="accent1">
-              <a:hueOff val="0"/>
-              <a:satOff val="0"/>
-              <a:lumOff val="0"/>
-              <a:alphaOff val="0"/>
-            </a:schemeClr>
-          </a:solidFill>
-          <a:prstDash val="solid"/>
-          <a:tailEnd type="arrow"/>
-        </a:ln>
-        <a:effectLst/>
-      </dsp:spPr>
-      <dsp:style>
-        <a:lnRef idx="1">
-          <a:scrgbClr r="0" g="0" b="0"/>
-        </a:lnRef>
-        <a:fillRef idx="0">
-          <a:scrgbClr r="0" g="0" b="0"/>
-        </a:fillRef>
-        <a:effectRef idx="0">
-          <a:scrgbClr r="0" g="0" b="0"/>
-        </a:effectRef>
-        <a:fontRef idx="minor"/>
-      </dsp:style>
-      <dsp:txBody>
-        <a:bodyPr spcFirstLastPara="0" vert="horz" wrap="square" lIns="12700" tIns="0" rIns="12700" bIns="0" numCol="1" spcCol="1270" anchor="ctr" anchorCtr="0">
-          <a:noAutofit/>
-        </a:bodyPr>
-        <a:lstStyle/>
-        <a:p>
-          <a:pPr lvl="0" algn="ctr" defTabSz="222250">
-            <a:lnSpc>
-              <a:spcPct val="90000"/>
-            </a:lnSpc>
-            <a:spcBef>
-              <a:spcPct val="0"/>
-            </a:spcBef>
-            <a:spcAft>
-              <a:spcPct val="35000"/>
-            </a:spcAft>
-          </a:pPr>
-          <a:endParaRPr lang="en-US" sz="500" kern="1200"/>
-        </a:p>
-      </dsp:txBody>
-      <dsp:txXfrm>
-        <a:off x="2803108" y="624844"/>
-        <a:ext cx="23983" cy="4796"/>
-      </dsp:txXfrm>
-    </dsp:sp>
-    <dsp:sp modelId="{1BB52588-8617-4361-87B3-C2CC7705A59E}">
-      <dsp:nvSpPr>
-        <dsp:cNvPr id="0" name=""/>
-        <dsp:cNvSpPr/>
-      </dsp:nvSpPr>
-      <dsp:spPr>
-        <a:xfrm>
-          <a:off x="506835" y="1584"/>
-          <a:ext cx="2085528" cy="1251317"/>
-        </a:xfrm>
-        <a:prstGeom prst="rect">
-          <a:avLst/>
-        </a:prstGeom>
-        <a:solidFill>
-          <a:schemeClr val="accent2">
-            <a:lumMod val="75000"/>
-          </a:schemeClr>
-        </a:solidFill>
-        <a:ln w="48000" cap="flat" cmpd="thickThin" algn="ctr">
-          <a:solidFill>
-            <a:schemeClr val="lt1">
-              <a:hueOff val="0"/>
-              <a:satOff val="0"/>
-              <a:lumOff val="0"/>
-              <a:alphaOff val="0"/>
-            </a:schemeClr>
-          </a:solidFill>
-          <a:prstDash val="solid"/>
-        </a:ln>
-        <a:effectLst/>
-      </dsp:spPr>
-      <dsp:style>
-        <a:lnRef idx="2">
-          <a:scrgbClr r="0" g="0" b="0"/>
-        </a:lnRef>
-        <a:fillRef idx="1">
-          <a:scrgbClr r="0" g="0" b="0"/>
-        </a:fillRef>
-        <a:effectRef idx="0">
-          <a:scrgbClr r="0" g="0" b="0"/>
-        </a:effectRef>
-        <a:fontRef idx="minor">
-          <a:schemeClr val="lt1"/>
-        </a:fontRef>
-      </dsp:style>
-      <dsp:txBody>
-        <a:bodyPr spcFirstLastPara="0" vert="horz" wrap="square" lIns="149352" tIns="149352" rIns="149352" bIns="149352" numCol="1" spcCol="1270" anchor="ctr" anchorCtr="0">
-          <a:noAutofit/>
-        </a:bodyPr>
-        <a:lstStyle/>
-        <a:p>
-          <a:pPr lvl="0" algn="ctr" defTabSz="933450">
-            <a:lnSpc>
-              <a:spcPct val="90000"/>
-            </a:lnSpc>
-            <a:spcBef>
-              <a:spcPct val="0"/>
-            </a:spcBef>
-            <a:spcAft>
-              <a:spcPct val="35000"/>
-            </a:spcAft>
-          </a:pPr>
-          <a:r>
-            <a:rPr lang="en-US" sz="2100" kern="1200" baseline="0" dirty="0" smtClean="0">
-              <a:solidFill>
-                <a:schemeClr val="tx1"/>
-              </a:solidFill>
-            </a:rPr>
-            <a:t>Create </a:t>
-          </a:r>
-          <a:r>
-            <a:rPr lang="en-US" sz="2100" kern="1200" baseline="0" dirty="0" smtClean="0">
-              <a:solidFill>
-                <a:schemeClr val="tx1"/>
-              </a:solidFill>
-            </a:rPr>
-            <a:t>dataset</a:t>
-          </a:r>
-          <a:endParaRPr lang="en-US" sz="2100" kern="1200" baseline="0" dirty="0">
-            <a:solidFill>
-              <a:schemeClr val="tx1"/>
-            </a:solidFill>
-          </a:endParaRPr>
-        </a:p>
-      </dsp:txBody>
-      <dsp:txXfrm>
-        <a:off x="506835" y="1584"/>
-        <a:ext cx="2085528" cy="1251317"/>
-      </dsp:txXfrm>
-    </dsp:sp>
-    <dsp:sp modelId="{9AA9DC35-418E-49F5-915E-FB5484DB561D}">
-      <dsp:nvSpPr>
-        <dsp:cNvPr id="0" name=""/>
-        <dsp:cNvSpPr/>
-      </dsp:nvSpPr>
-      <dsp:spPr>
-        <a:xfrm>
-          <a:off x="5155764" y="581522"/>
-          <a:ext cx="449071" cy="91440"/>
-        </a:xfrm>
-        <a:custGeom>
-          <a:avLst/>
-          <a:gdLst/>
-          <a:ahLst/>
-          <a:cxnLst/>
-          <a:rect l="0" t="0" r="0" b="0"/>
-          <a:pathLst>
-            <a:path>
-              <a:moveTo>
-                <a:pt x="0" y="45720"/>
-              </a:moveTo>
-              <a:lnTo>
-                <a:pt x="449071" y="45720"/>
-              </a:lnTo>
-            </a:path>
-          </a:pathLst>
-        </a:custGeom>
-        <a:noFill/>
-        <a:ln w="6350" cap="rnd" cmpd="sng" algn="ctr">
-          <a:solidFill>
-            <a:schemeClr val="accent1">
-              <a:hueOff val="0"/>
-              <a:satOff val="0"/>
-              <a:lumOff val="0"/>
-              <a:alphaOff val="0"/>
-            </a:schemeClr>
-          </a:solidFill>
-          <a:prstDash val="solid"/>
-          <a:tailEnd type="arrow"/>
-        </a:ln>
-        <a:effectLst/>
-      </dsp:spPr>
-      <dsp:style>
-        <a:lnRef idx="1">
-          <a:scrgbClr r="0" g="0" b="0"/>
-        </a:lnRef>
-        <a:fillRef idx="0">
-          <a:scrgbClr r="0" g="0" b="0"/>
-        </a:fillRef>
-        <a:effectRef idx="0">
-          <a:scrgbClr r="0" g="0" b="0"/>
-        </a:effectRef>
-        <a:fontRef idx="minor"/>
-      </dsp:style>
-      <dsp:txBody>
-        <a:bodyPr spcFirstLastPara="0" vert="horz" wrap="square" lIns="12700" tIns="0" rIns="12700" bIns="0" numCol="1" spcCol="1270" anchor="ctr" anchorCtr="0">
-          <a:noAutofit/>
-        </a:bodyPr>
-        <a:lstStyle/>
-        <a:p>
-          <a:pPr lvl="0" algn="ctr" defTabSz="222250">
-            <a:lnSpc>
-              <a:spcPct val="90000"/>
-            </a:lnSpc>
-            <a:spcBef>
-              <a:spcPct val="0"/>
-            </a:spcBef>
-            <a:spcAft>
-              <a:spcPct val="35000"/>
-            </a:spcAft>
-          </a:pPr>
-          <a:endParaRPr lang="en-US" sz="500" kern="1200"/>
-        </a:p>
-      </dsp:txBody>
-      <dsp:txXfrm>
-        <a:off x="5368308" y="624844"/>
-        <a:ext cx="23983" cy="4796"/>
-      </dsp:txXfrm>
-    </dsp:sp>
-    <dsp:sp modelId="{AD5B0578-AF72-41FC-9112-992F27B502F1}">
-      <dsp:nvSpPr>
-        <dsp:cNvPr id="0" name=""/>
-        <dsp:cNvSpPr/>
-      </dsp:nvSpPr>
-      <dsp:spPr>
-        <a:xfrm>
-          <a:off x="3072035" y="1584"/>
-          <a:ext cx="2085528" cy="1251317"/>
-        </a:xfrm>
-        <a:prstGeom prst="rect">
-          <a:avLst/>
-        </a:prstGeom>
-        <a:solidFill>
-          <a:schemeClr val="accent2">
-            <a:lumMod val="75000"/>
-          </a:schemeClr>
-        </a:solidFill>
-        <a:ln w="48000" cap="flat" cmpd="thickThin" algn="ctr">
-          <a:solidFill>
-            <a:schemeClr val="lt1">
-              <a:hueOff val="0"/>
-              <a:satOff val="0"/>
-              <a:lumOff val="0"/>
-              <a:alphaOff val="0"/>
-            </a:schemeClr>
-          </a:solidFill>
-          <a:prstDash val="solid"/>
-        </a:ln>
-        <a:effectLst/>
-      </dsp:spPr>
-      <dsp:style>
-        <a:lnRef idx="2">
-          <a:scrgbClr r="0" g="0" b="0"/>
-        </a:lnRef>
-        <a:fillRef idx="1">
-          <a:scrgbClr r="0" g="0" b="0"/>
-        </a:fillRef>
-        <a:effectRef idx="0">
-          <a:scrgbClr r="0" g="0" b="0"/>
-        </a:effectRef>
-        <a:fontRef idx="minor">
-          <a:schemeClr val="lt1"/>
-        </a:fontRef>
-      </dsp:style>
-      <dsp:txBody>
-        <a:bodyPr spcFirstLastPara="0" vert="horz" wrap="square" lIns="149352" tIns="149352" rIns="149352" bIns="149352" numCol="1" spcCol="1270" anchor="ctr" anchorCtr="0">
-          <a:noAutofit/>
-        </a:bodyPr>
-        <a:lstStyle/>
-        <a:p>
-          <a:pPr lvl="0" algn="ctr" defTabSz="933450">
-            <a:lnSpc>
-              <a:spcPct val="90000"/>
-            </a:lnSpc>
-            <a:spcBef>
-              <a:spcPct val="0"/>
-            </a:spcBef>
-            <a:spcAft>
-              <a:spcPct val="35000"/>
-            </a:spcAft>
-          </a:pPr>
-          <a:r>
-            <a:rPr lang="en-US" sz="2100" kern="1200" dirty="0" smtClean="0">
-              <a:solidFill>
-                <a:schemeClr val="tx1"/>
-              </a:solidFill>
-            </a:rPr>
-            <a:t>Clean and format data for analysis</a:t>
-          </a:r>
-          <a:endParaRPr lang="en-US" sz="2100" kern="1200" dirty="0">
-            <a:solidFill>
-              <a:schemeClr val="tx1"/>
-            </a:solidFill>
-          </a:endParaRPr>
-        </a:p>
-      </dsp:txBody>
-      <dsp:txXfrm>
-        <a:off x="3072035" y="1584"/>
-        <a:ext cx="2085528" cy="1251317"/>
-      </dsp:txXfrm>
-    </dsp:sp>
-    <dsp:sp modelId="{B64B2EBB-C71A-4A8B-8C6C-E475856548F3}">
-      <dsp:nvSpPr>
-        <dsp:cNvPr id="0" name=""/>
-        <dsp:cNvSpPr/>
-      </dsp:nvSpPr>
-      <dsp:spPr>
-        <a:xfrm>
-          <a:off x="1549599" y="1251101"/>
-          <a:ext cx="5130400" cy="449071"/>
-        </a:xfrm>
-        <a:custGeom>
-          <a:avLst/>
-          <a:gdLst/>
-          <a:ahLst/>
-          <a:cxnLst/>
-          <a:rect l="0" t="0" r="0" b="0"/>
-          <a:pathLst>
-            <a:path>
-              <a:moveTo>
-                <a:pt x="5130400" y="0"/>
-              </a:moveTo>
-              <a:lnTo>
-                <a:pt x="5130400" y="241635"/>
-              </a:lnTo>
-              <a:lnTo>
-                <a:pt x="0" y="241635"/>
-              </a:lnTo>
-              <a:lnTo>
-                <a:pt x="0" y="449071"/>
-              </a:lnTo>
-            </a:path>
-          </a:pathLst>
-        </a:custGeom>
-        <a:noFill/>
-        <a:ln w="6350" cap="rnd" cmpd="sng" algn="ctr">
-          <a:solidFill>
-            <a:schemeClr val="accent1">
-              <a:hueOff val="0"/>
-              <a:satOff val="0"/>
-              <a:lumOff val="0"/>
-              <a:alphaOff val="0"/>
-            </a:schemeClr>
-          </a:solidFill>
-          <a:prstDash val="solid"/>
-          <a:tailEnd type="arrow"/>
-        </a:ln>
-        <a:effectLst/>
-      </dsp:spPr>
-      <dsp:style>
-        <a:lnRef idx="1">
-          <a:scrgbClr r="0" g="0" b="0"/>
-        </a:lnRef>
-        <a:fillRef idx="0">
-          <a:scrgbClr r="0" g="0" b="0"/>
-        </a:fillRef>
-        <a:effectRef idx="0">
-          <a:scrgbClr r="0" g="0" b="0"/>
-        </a:effectRef>
-        <a:fontRef idx="minor"/>
-      </dsp:style>
-      <dsp:txBody>
-        <a:bodyPr spcFirstLastPara="0" vert="horz" wrap="square" lIns="12700" tIns="0" rIns="12700" bIns="0" numCol="1" spcCol="1270" anchor="ctr" anchorCtr="0">
-          <a:noAutofit/>
-        </a:bodyPr>
-        <a:lstStyle/>
-        <a:p>
-          <a:pPr lvl="0" algn="ctr" defTabSz="222250">
-            <a:lnSpc>
-              <a:spcPct val="90000"/>
-            </a:lnSpc>
-            <a:spcBef>
-              <a:spcPct val="0"/>
-            </a:spcBef>
-            <a:spcAft>
-              <a:spcPct val="35000"/>
-            </a:spcAft>
-          </a:pPr>
-          <a:endParaRPr lang="en-US" sz="500" kern="1200"/>
-        </a:p>
-      </dsp:txBody>
-      <dsp:txXfrm>
-        <a:off x="3985980" y="1473238"/>
-        <a:ext cx="257638" cy="4796"/>
-      </dsp:txXfrm>
-    </dsp:sp>
-    <dsp:sp modelId="{BEC7D7D3-F6F7-4E37-9CFA-857A2F8F14E4}">
-      <dsp:nvSpPr>
-        <dsp:cNvPr id="0" name=""/>
-        <dsp:cNvSpPr/>
-      </dsp:nvSpPr>
-      <dsp:spPr>
-        <a:xfrm>
-          <a:off x="5637235" y="1584"/>
-          <a:ext cx="2085528" cy="1251317"/>
-        </a:xfrm>
-        <a:prstGeom prst="rect">
-          <a:avLst/>
-        </a:prstGeom>
-        <a:solidFill>
-          <a:schemeClr val="accent2">
-            <a:lumMod val="75000"/>
-          </a:schemeClr>
-        </a:solidFill>
-        <a:ln w="48000" cap="flat" cmpd="thickThin" algn="ctr">
-          <a:solidFill>
-            <a:schemeClr val="lt1">
-              <a:hueOff val="0"/>
-              <a:satOff val="0"/>
-              <a:lumOff val="0"/>
-              <a:alphaOff val="0"/>
-            </a:schemeClr>
-          </a:solidFill>
-          <a:prstDash val="solid"/>
-        </a:ln>
-        <a:effectLst/>
-      </dsp:spPr>
-      <dsp:style>
-        <a:lnRef idx="2">
-          <a:scrgbClr r="0" g="0" b="0"/>
-        </a:lnRef>
-        <a:fillRef idx="1">
-          <a:scrgbClr r="0" g="0" b="0"/>
-        </a:fillRef>
-        <a:effectRef idx="0">
-          <a:scrgbClr r="0" g="0" b="0"/>
-        </a:effectRef>
-        <a:fontRef idx="minor">
-          <a:schemeClr val="lt1"/>
-        </a:fontRef>
-      </dsp:style>
-      <dsp:txBody>
-        <a:bodyPr spcFirstLastPara="0" vert="horz" wrap="square" lIns="149352" tIns="149352" rIns="149352" bIns="149352" numCol="1" spcCol="1270" anchor="ctr" anchorCtr="0">
-          <a:noAutofit/>
-        </a:bodyPr>
-        <a:lstStyle/>
-        <a:p>
-          <a:pPr lvl="0" algn="ctr" defTabSz="933450">
-            <a:lnSpc>
-              <a:spcPct val="90000"/>
-            </a:lnSpc>
-            <a:spcBef>
-              <a:spcPct val="0"/>
-            </a:spcBef>
-            <a:spcAft>
-              <a:spcPct val="35000"/>
-            </a:spcAft>
-          </a:pPr>
-          <a:r>
-            <a:rPr lang="en-US" sz="2100" kern="1200" dirty="0" smtClean="0">
-              <a:solidFill>
-                <a:schemeClr val="tx1"/>
-              </a:solidFill>
-            </a:rPr>
-            <a:t>Perform cluster analysis</a:t>
-          </a:r>
-          <a:endParaRPr lang="en-US" sz="2100" kern="1200" dirty="0">
-            <a:solidFill>
-              <a:schemeClr val="tx1"/>
-            </a:solidFill>
-          </a:endParaRPr>
-        </a:p>
-      </dsp:txBody>
-      <dsp:txXfrm>
-        <a:off x="5637235" y="1584"/>
-        <a:ext cx="2085528" cy="1251317"/>
-      </dsp:txXfrm>
-    </dsp:sp>
-    <dsp:sp modelId="{CD97B47E-8C6F-4B7D-9FAD-92A7193ED4BB}">
-      <dsp:nvSpPr>
-        <dsp:cNvPr id="0" name=""/>
-        <dsp:cNvSpPr/>
-      </dsp:nvSpPr>
-      <dsp:spPr>
-        <a:xfrm>
-          <a:off x="2590564" y="2312511"/>
-          <a:ext cx="449071" cy="91440"/>
-        </a:xfrm>
-        <a:custGeom>
-          <a:avLst/>
-          <a:gdLst/>
-          <a:ahLst/>
-          <a:cxnLst/>
-          <a:rect l="0" t="0" r="0" b="0"/>
-          <a:pathLst>
-            <a:path>
-              <a:moveTo>
-                <a:pt x="0" y="45720"/>
-              </a:moveTo>
-              <a:lnTo>
-                <a:pt x="449071" y="45720"/>
-              </a:lnTo>
-            </a:path>
-          </a:pathLst>
-        </a:custGeom>
-        <a:noFill/>
-        <a:ln w="6350" cap="rnd" cmpd="sng" algn="ctr">
-          <a:solidFill>
-            <a:schemeClr val="accent1">
-              <a:hueOff val="0"/>
-              <a:satOff val="0"/>
-              <a:lumOff val="0"/>
-              <a:alphaOff val="0"/>
-            </a:schemeClr>
-          </a:solidFill>
-          <a:prstDash val="solid"/>
-          <a:tailEnd type="arrow"/>
-        </a:ln>
-        <a:effectLst/>
-      </dsp:spPr>
-      <dsp:style>
-        <a:lnRef idx="1">
-          <a:scrgbClr r="0" g="0" b="0"/>
-        </a:lnRef>
-        <a:fillRef idx="0">
-          <a:scrgbClr r="0" g="0" b="0"/>
-        </a:fillRef>
-        <a:effectRef idx="0">
-          <a:scrgbClr r="0" g="0" b="0"/>
-        </a:effectRef>
-        <a:fontRef idx="minor"/>
-      </dsp:style>
-      <dsp:txBody>
-        <a:bodyPr spcFirstLastPara="0" vert="horz" wrap="square" lIns="12700" tIns="0" rIns="12700" bIns="0" numCol="1" spcCol="1270" anchor="ctr" anchorCtr="0">
-          <a:noAutofit/>
-        </a:bodyPr>
-        <a:lstStyle/>
-        <a:p>
-          <a:pPr lvl="0" algn="ctr" defTabSz="222250">
-            <a:lnSpc>
-              <a:spcPct val="90000"/>
-            </a:lnSpc>
-            <a:spcBef>
-              <a:spcPct val="0"/>
-            </a:spcBef>
-            <a:spcAft>
-              <a:spcPct val="35000"/>
-            </a:spcAft>
-          </a:pPr>
-          <a:endParaRPr lang="en-US" sz="500" kern="1200"/>
-        </a:p>
-      </dsp:txBody>
-      <dsp:txXfrm>
-        <a:off x="2803108" y="2355833"/>
-        <a:ext cx="23983" cy="4796"/>
-      </dsp:txXfrm>
-    </dsp:sp>
-    <dsp:sp modelId="{49EE1E55-CE67-42BC-A800-325C12A118A5}">
-      <dsp:nvSpPr>
-        <dsp:cNvPr id="0" name=""/>
-        <dsp:cNvSpPr/>
-      </dsp:nvSpPr>
-      <dsp:spPr>
-        <a:xfrm>
-          <a:off x="506835" y="1732572"/>
-          <a:ext cx="2085528" cy="1251317"/>
-        </a:xfrm>
-        <a:prstGeom prst="rect">
-          <a:avLst/>
-        </a:prstGeom>
-        <a:solidFill>
-          <a:schemeClr val="accent1">
-            <a:hueOff val="0"/>
-            <a:satOff val="0"/>
-            <a:lumOff val="0"/>
-            <a:alphaOff val="0"/>
-          </a:schemeClr>
-        </a:solidFill>
-        <a:ln w="48000" cap="flat" cmpd="thickThin" algn="ctr">
-          <a:solidFill>
-            <a:schemeClr val="lt1">
-              <a:hueOff val="0"/>
-              <a:satOff val="0"/>
-              <a:lumOff val="0"/>
-              <a:alphaOff val="0"/>
-            </a:schemeClr>
-          </a:solidFill>
-          <a:prstDash val="solid"/>
-        </a:ln>
-        <a:effectLst/>
-      </dsp:spPr>
-      <dsp:style>
-        <a:lnRef idx="2">
-          <a:scrgbClr r="0" g="0" b="0"/>
-        </a:lnRef>
-        <a:fillRef idx="1">
-          <a:scrgbClr r="0" g="0" b="0"/>
-        </a:fillRef>
-        <a:effectRef idx="0">
-          <a:scrgbClr r="0" g="0" b="0"/>
-        </a:effectRef>
-        <a:fontRef idx="minor">
-          <a:schemeClr val="lt1"/>
-        </a:fontRef>
-      </dsp:style>
-      <dsp:txBody>
-        <a:bodyPr spcFirstLastPara="0" vert="horz" wrap="square" lIns="149352" tIns="149352" rIns="149352" bIns="149352" numCol="1" spcCol="1270" anchor="ctr" anchorCtr="0">
-          <a:noAutofit/>
-        </a:bodyPr>
-        <a:lstStyle/>
-        <a:p>
-          <a:pPr lvl="0" algn="ctr" defTabSz="933450">
-            <a:lnSpc>
-              <a:spcPct val="90000"/>
-            </a:lnSpc>
-            <a:spcBef>
-              <a:spcPct val="0"/>
-            </a:spcBef>
-            <a:spcAft>
-              <a:spcPct val="35000"/>
-            </a:spcAft>
-          </a:pPr>
-          <a:r>
-            <a:rPr lang="en-US" sz="2100" kern="1200" dirty="0" smtClean="0"/>
-            <a:t>Visualize results</a:t>
-          </a:r>
-          <a:endParaRPr lang="en-US" sz="2100" kern="1200" dirty="0"/>
-        </a:p>
-      </dsp:txBody>
-      <dsp:txXfrm>
-        <a:off x="506835" y="1732572"/>
-        <a:ext cx="2085528" cy="1251317"/>
-      </dsp:txXfrm>
-    </dsp:sp>
-    <dsp:sp modelId="{1A3C7C85-CC4F-4DD3-99D8-E6C4C95C3D26}">
-      <dsp:nvSpPr>
-        <dsp:cNvPr id="0" name=""/>
-        <dsp:cNvSpPr/>
-      </dsp:nvSpPr>
-      <dsp:spPr>
-        <a:xfrm>
-          <a:off x="5155764" y="2312511"/>
-          <a:ext cx="449071" cy="91440"/>
-        </a:xfrm>
-        <a:custGeom>
-          <a:avLst/>
-          <a:gdLst/>
-          <a:ahLst/>
-          <a:cxnLst/>
-          <a:rect l="0" t="0" r="0" b="0"/>
-          <a:pathLst>
-            <a:path>
-              <a:moveTo>
-                <a:pt x="0" y="45720"/>
-              </a:moveTo>
-              <a:lnTo>
-                <a:pt x="449071" y="45720"/>
-              </a:lnTo>
-            </a:path>
-          </a:pathLst>
-        </a:custGeom>
-        <a:noFill/>
-        <a:ln w="6350" cap="rnd" cmpd="sng" algn="ctr">
-          <a:solidFill>
-            <a:schemeClr val="accent1">
-              <a:hueOff val="0"/>
-              <a:satOff val="0"/>
-              <a:lumOff val="0"/>
-              <a:alphaOff val="0"/>
-            </a:schemeClr>
-          </a:solidFill>
-          <a:prstDash val="solid"/>
-          <a:tailEnd type="arrow"/>
-        </a:ln>
-        <a:effectLst/>
-      </dsp:spPr>
-      <dsp:style>
-        <a:lnRef idx="1">
-          <a:scrgbClr r="0" g="0" b="0"/>
-        </a:lnRef>
-        <a:fillRef idx="0">
-          <a:scrgbClr r="0" g="0" b="0"/>
-        </a:fillRef>
-        <a:effectRef idx="0">
-          <a:scrgbClr r="0" g="0" b="0"/>
-        </a:effectRef>
-        <a:fontRef idx="minor"/>
-      </dsp:style>
-      <dsp:txBody>
-        <a:bodyPr spcFirstLastPara="0" vert="horz" wrap="square" lIns="12700" tIns="0" rIns="12700" bIns="0" numCol="1" spcCol="1270" anchor="ctr" anchorCtr="0">
-          <a:noAutofit/>
-        </a:bodyPr>
-        <a:lstStyle/>
-        <a:p>
-          <a:pPr lvl="0" algn="ctr" defTabSz="222250">
-            <a:lnSpc>
-              <a:spcPct val="90000"/>
-            </a:lnSpc>
-            <a:spcBef>
-              <a:spcPct val="0"/>
-            </a:spcBef>
-            <a:spcAft>
-              <a:spcPct val="35000"/>
-            </a:spcAft>
-          </a:pPr>
-          <a:endParaRPr lang="en-US" sz="500" kern="1200"/>
-        </a:p>
-      </dsp:txBody>
-      <dsp:txXfrm>
-        <a:off x="5368308" y="2355833"/>
-        <a:ext cx="23983" cy="4796"/>
-      </dsp:txXfrm>
-    </dsp:sp>
-    <dsp:sp modelId="{E2B255F3-8F3C-462B-9120-5E58F5701827}">
-      <dsp:nvSpPr>
-        <dsp:cNvPr id="0" name=""/>
-        <dsp:cNvSpPr/>
-      </dsp:nvSpPr>
-      <dsp:spPr>
-        <a:xfrm>
-          <a:off x="3072035" y="1732572"/>
-          <a:ext cx="2085528" cy="1251317"/>
-        </a:xfrm>
-        <a:prstGeom prst="rect">
-          <a:avLst/>
-        </a:prstGeom>
-        <a:solidFill>
-          <a:schemeClr val="accent1">
-            <a:hueOff val="0"/>
-            <a:satOff val="0"/>
-            <a:lumOff val="0"/>
-            <a:alphaOff val="0"/>
-          </a:schemeClr>
-        </a:solidFill>
-        <a:ln w="48000" cap="flat" cmpd="thickThin" algn="ctr">
-          <a:solidFill>
-            <a:schemeClr val="lt1">
-              <a:hueOff val="0"/>
-              <a:satOff val="0"/>
-              <a:lumOff val="0"/>
-              <a:alphaOff val="0"/>
-            </a:schemeClr>
-          </a:solidFill>
-          <a:prstDash val="solid"/>
-        </a:ln>
-        <a:effectLst/>
-      </dsp:spPr>
-      <dsp:style>
-        <a:lnRef idx="2">
-          <a:scrgbClr r="0" g="0" b="0"/>
-        </a:lnRef>
-        <a:fillRef idx="1">
-          <a:scrgbClr r="0" g="0" b="0"/>
-        </a:fillRef>
-        <a:effectRef idx="0">
-          <a:scrgbClr r="0" g="0" b="0"/>
-        </a:effectRef>
-        <a:fontRef idx="minor">
-          <a:schemeClr val="lt1"/>
-        </a:fontRef>
-      </dsp:style>
-      <dsp:txBody>
-        <a:bodyPr spcFirstLastPara="0" vert="horz" wrap="square" lIns="149352" tIns="149352" rIns="149352" bIns="149352" numCol="1" spcCol="1270" anchor="ctr" anchorCtr="0">
-          <a:noAutofit/>
-        </a:bodyPr>
-        <a:lstStyle/>
-        <a:p>
-          <a:pPr lvl="0" algn="ctr" defTabSz="933450">
-            <a:lnSpc>
-              <a:spcPct val="90000"/>
-            </a:lnSpc>
-            <a:spcBef>
-              <a:spcPct val="0"/>
-            </a:spcBef>
-            <a:spcAft>
-              <a:spcPct val="35000"/>
-            </a:spcAft>
-          </a:pPr>
-          <a:r>
-            <a:rPr lang="en-US" sz="2100" kern="1200" dirty="0" smtClean="0"/>
-            <a:t>Test clusters </a:t>
-          </a:r>
-          <a:r>
-            <a:rPr lang="en-US" sz="2100" kern="1200" dirty="0" smtClean="0"/>
-            <a:t>with existing categories</a:t>
-          </a:r>
-          <a:endParaRPr lang="en-US" sz="2100" kern="1200" dirty="0"/>
-        </a:p>
-      </dsp:txBody>
-      <dsp:txXfrm>
-        <a:off x="3072035" y="1732572"/>
-        <a:ext cx="2085528" cy="1251317"/>
-      </dsp:txXfrm>
-    </dsp:sp>
-    <dsp:sp modelId="{8461EAE7-B75C-4384-B225-2573E43AF67A}">
-      <dsp:nvSpPr>
-        <dsp:cNvPr id="0" name=""/>
-        <dsp:cNvSpPr/>
-      </dsp:nvSpPr>
-      <dsp:spPr>
-        <a:xfrm>
-          <a:off x="4114799" y="2982090"/>
-          <a:ext cx="2565200" cy="329145"/>
-        </a:xfrm>
-        <a:custGeom>
-          <a:avLst/>
-          <a:gdLst/>
-          <a:ahLst/>
-          <a:cxnLst/>
-          <a:rect l="0" t="0" r="0" b="0"/>
-          <a:pathLst>
-            <a:path>
-              <a:moveTo>
-                <a:pt x="2565200" y="0"/>
-              </a:moveTo>
-              <a:lnTo>
-                <a:pt x="2565200" y="181672"/>
-              </a:lnTo>
-              <a:lnTo>
-                <a:pt x="0" y="181672"/>
-              </a:lnTo>
-              <a:lnTo>
-                <a:pt x="0" y="329145"/>
-              </a:lnTo>
-            </a:path>
-          </a:pathLst>
-        </a:custGeom>
-        <a:noFill/>
-        <a:ln w="6350" cap="rnd" cmpd="sng" algn="ctr">
-          <a:solidFill>
-            <a:scrgbClr r="0" g="0" b="0">
-              <a:shade val="95000"/>
-              <a:satMod val="105000"/>
-            </a:scrgbClr>
-          </a:solidFill>
-          <a:prstDash val="dashDot"/>
-          <a:tailEnd type="arrow"/>
-        </a:ln>
-        <a:effectLst/>
-      </dsp:spPr>
-      <dsp:style>
-        <a:lnRef idx="1">
-          <a:scrgbClr r="0" g="0" b="0"/>
-        </a:lnRef>
-        <a:fillRef idx="0">
-          <a:scrgbClr r="0" g="0" b="0"/>
-        </a:fillRef>
-        <a:effectRef idx="0">
-          <a:scrgbClr r="0" g="0" b="0"/>
-        </a:effectRef>
-        <a:fontRef idx="minor"/>
-      </dsp:style>
-      <dsp:txBody>
-        <a:bodyPr spcFirstLastPara="0" vert="horz" wrap="square" lIns="12700" tIns="0" rIns="12700" bIns="0" numCol="1" spcCol="1270" anchor="ctr" anchorCtr="0">
-          <a:noAutofit/>
-        </a:bodyPr>
-        <a:lstStyle/>
-        <a:p>
-          <a:pPr lvl="0" algn="ctr" defTabSz="222250">
-            <a:lnSpc>
-              <a:spcPct val="90000"/>
-            </a:lnSpc>
-            <a:spcBef>
-              <a:spcPct val="0"/>
-            </a:spcBef>
-            <a:spcAft>
-              <a:spcPct val="35000"/>
-            </a:spcAft>
-          </a:pPr>
-          <a:endParaRPr lang="en-US" sz="500" kern="1200"/>
-        </a:p>
-      </dsp:txBody>
-      <dsp:txXfrm>
-        <a:off x="5332642" y="3144264"/>
-        <a:ext cx="129515" cy="4796"/>
-      </dsp:txXfrm>
-    </dsp:sp>
-    <dsp:sp modelId="{BB41F561-C362-4AB7-B8BE-32B9060FFCAD}">
-      <dsp:nvSpPr>
-        <dsp:cNvPr id="0" name=""/>
-        <dsp:cNvSpPr/>
-      </dsp:nvSpPr>
-      <dsp:spPr>
-        <a:xfrm>
-          <a:off x="5637235" y="1732572"/>
-          <a:ext cx="2085528" cy="1251317"/>
-        </a:xfrm>
-        <a:prstGeom prst="rect">
-          <a:avLst/>
-        </a:prstGeom>
-        <a:solidFill>
-          <a:schemeClr val="accent1">
-            <a:hueOff val="0"/>
-            <a:satOff val="0"/>
-            <a:lumOff val="0"/>
-            <a:alphaOff val="0"/>
-          </a:schemeClr>
-        </a:solidFill>
-        <a:ln w="48000" cap="flat" cmpd="thickThin" algn="ctr">
-          <a:solidFill>
-            <a:schemeClr val="lt1">
-              <a:hueOff val="0"/>
-              <a:satOff val="0"/>
-              <a:lumOff val="0"/>
-              <a:alphaOff val="0"/>
-            </a:schemeClr>
-          </a:solidFill>
-          <a:prstDash val="solid"/>
-        </a:ln>
-        <a:effectLst/>
-      </dsp:spPr>
-      <dsp:style>
-        <a:lnRef idx="2">
-          <a:scrgbClr r="0" g="0" b="0"/>
-        </a:lnRef>
-        <a:fillRef idx="1">
-          <a:scrgbClr r="0" g="0" b="0"/>
-        </a:fillRef>
-        <a:effectRef idx="0">
-          <a:scrgbClr r="0" g="0" b="0"/>
-        </a:effectRef>
-        <a:fontRef idx="minor">
-          <a:schemeClr val="lt1"/>
-        </a:fontRef>
-      </dsp:style>
-      <dsp:txBody>
-        <a:bodyPr spcFirstLastPara="0" vert="horz" wrap="square" lIns="149352" tIns="149352" rIns="149352" bIns="149352" numCol="1" spcCol="1270" anchor="ctr" anchorCtr="0">
-          <a:noAutofit/>
-        </a:bodyPr>
-        <a:lstStyle/>
-        <a:p>
-          <a:pPr lvl="0" algn="ctr" defTabSz="933450">
-            <a:lnSpc>
-              <a:spcPct val="90000"/>
-            </a:lnSpc>
-            <a:spcBef>
-              <a:spcPct val="0"/>
-            </a:spcBef>
-            <a:spcAft>
-              <a:spcPct val="35000"/>
-            </a:spcAft>
-          </a:pPr>
-          <a:r>
-            <a:rPr lang="en-US" sz="2100" kern="1200" dirty="0" smtClean="0"/>
-            <a:t>Share results with internally with team</a:t>
-          </a:r>
-          <a:endParaRPr lang="en-US" sz="2100" kern="1200" dirty="0"/>
-        </a:p>
-      </dsp:txBody>
-      <dsp:txXfrm>
-        <a:off x="5637235" y="1732572"/>
-        <a:ext cx="2085528" cy="1251317"/>
-      </dsp:txXfrm>
-    </dsp:sp>
-    <dsp:sp modelId="{89FF870D-B82F-46A1-8FD9-E056C0E2F438}">
-      <dsp:nvSpPr>
-        <dsp:cNvPr id="0" name=""/>
-        <dsp:cNvSpPr/>
-      </dsp:nvSpPr>
-      <dsp:spPr>
-        <a:xfrm>
-          <a:off x="3072035" y="3343635"/>
-          <a:ext cx="2085528" cy="1251317"/>
-        </a:xfrm>
-        <a:prstGeom prst="rect">
-          <a:avLst/>
-        </a:prstGeom>
-        <a:solidFill>
-          <a:schemeClr val="accent1">
-            <a:hueOff val="0"/>
-            <a:satOff val="0"/>
-            <a:lumOff val="0"/>
-            <a:alphaOff val="0"/>
-          </a:schemeClr>
-        </a:solidFill>
-        <a:ln w="48000" cap="flat" cmpd="thickThin" algn="ctr">
-          <a:solidFill>
-            <a:schemeClr val="lt1">
-              <a:hueOff val="0"/>
-              <a:satOff val="0"/>
-              <a:lumOff val="0"/>
-              <a:alphaOff val="0"/>
-            </a:schemeClr>
-          </a:solidFill>
-          <a:prstDash val="solid"/>
-        </a:ln>
-        <a:effectLst/>
-      </dsp:spPr>
-      <dsp:style>
-        <a:lnRef idx="2">
-          <a:scrgbClr r="0" g="0" b="0"/>
-        </a:lnRef>
-        <a:fillRef idx="1">
-          <a:scrgbClr r="0" g="0" b="0"/>
-        </a:fillRef>
-        <a:effectRef idx="0">
-          <a:scrgbClr r="0" g="0" b="0"/>
-        </a:effectRef>
-        <a:fontRef idx="minor">
-          <a:schemeClr val="lt1"/>
-        </a:fontRef>
-      </dsp:style>
-      <dsp:txBody>
-        <a:bodyPr spcFirstLastPara="0" vert="horz" wrap="square" lIns="149352" tIns="149352" rIns="149352" bIns="149352" numCol="1" spcCol="1270" anchor="ctr" anchorCtr="0">
-          <a:noAutofit/>
-        </a:bodyPr>
-        <a:lstStyle/>
-        <a:p>
-          <a:pPr lvl="0" algn="ctr" defTabSz="933450">
-            <a:lnSpc>
-              <a:spcPct val="90000"/>
-            </a:lnSpc>
-            <a:spcBef>
-              <a:spcPct val="0"/>
-            </a:spcBef>
-            <a:spcAft>
-              <a:spcPct val="35000"/>
-            </a:spcAft>
-          </a:pPr>
-          <a:r>
-            <a:rPr lang="en-US" sz="2100" kern="1200" dirty="0" smtClean="0"/>
-            <a:t>Disseminate results to other stakeholders</a:t>
-          </a:r>
-          <a:endParaRPr lang="en-US" sz="2100" kern="1200" dirty="0"/>
-        </a:p>
-      </dsp:txBody>
-      <dsp:txXfrm>
-        <a:off x="3072035" y="3343635"/>
-        <a:ext cx="2085528" cy="1251317"/>
-      </dsp:txXfrm>
-    </dsp:sp>
   </dsp:spTree>
 </dsp:drawing>
 </file>
@@ -10719,8 +9659,8 @@
         </p:nvSpPr>
         <p:spPr>
           <a:xfrm>
-            <a:off x="457200" y="1228726"/>
-            <a:ext cx="8229600" cy="4897438"/>
+            <a:off x="457200" y="1352550"/>
+            <a:ext cx="8229600" cy="4773613"/>
           </a:xfrm>
         </p:spPr>
         <p:txBody>
@@ -10729,21 +9669,46 @@
           <a:p>
             <a:r>
               <a:rPr lang="en-US" dirty="0" smtClean="0"/>
-              <a:t>How to visualize clusters with categorical data?</a:t>
+              <a:t>Action records were either blank or populated with record name</a:t>
             </a:r>
           </a:p>
           <a:p>
             <a:pPr lvl="1"/>
             <a:r>
               <a:rPr lang="en-US" dirty="0" smtClean="0"/>
-              <a:t>So far, all clustering visualizations require numerical data</a:t>
-            </a:r>
-          </a:p>
-          <a:p>
-            <a:pPr lvl="1"/>
+              <a:t>Used </a:t>
+            </a:r>
+            <a:r>
+              <a:rPr lang="en-US" dirty="0" err="1" smtClean="0">
+                <a:latin typeface="Courier" pitchFamily="49" charset="0"/>
+              </a:rPr>
+              <a:t>ifthen</a:t>
+            </a:r>
             <a:r>
               <a:rPr lang="en-US" dirty="0" smtClean="0"/>
-              <a:t>Difficult to find information on creating elbow and silhouette graphs with categorical clusters</a:t>
+              <a:t> statement to create </a:t>
+            </a:r>
+            <a:r>
+              <a:rPr lang="en-US" dirty="0"/>
+              <a:t>indicator variables for action records </a:t>
+            </a:r>
+            <a:r>
+              <a:rPr lang="en-US" dirty="0" smtClean="0"/>
+              <a:t>(“Yes”/“No”)</a:t>
+            </a:r>
+          </a:p>
+          <a:p>
+            <a:r>
+              <a:rPr lang="en-US" dirty="0" smtClean="0"/>
+              <a:t>Imputed NA </a:t>
+            </a:r>
+            <a:r>
+              <a:rPr lang="en-US" dirty="0"/>
+              <a:t>variables for categorical data with </a:t>
+            </a:r>
+            <a:r>
+              <a:rPr lang="en-US" dirty="0" smtClean="0"/>
+              <a:t>a separate “None” factor</a:t>
             </a:r>
             <a:endParaRPr lang="en-US" dirty="0"/>
           </a:p>
@@ -10765,8 +9730,12 @@
           <a:lstStyle/>
           <a:p>
             <a:r>
+              <a:rPr lang="en-US" dirty="0"/>
+              <a:t>Transformation of </a:t>
+            </a:r>
+            <a:r>
               <a:rPr lang="en-US" dirty="0" smtClean="0"/>
-              <a:t>New Questions</a:t>
+              <a:t>Data (cont.)</a:t>
             </a:r>
             <a:endParaRPr lang="en-US" dirty="0"/>
           </a:p>
@@ -10775,7 +9744,7 @@
     </p:spTree>
     <p:extLst>
       <p:ext uri="{BB962C8B-B14F-4D97-AF65-F5344CB8AC3E}">
-        <p14:creationId xmlns:p14="http://schemas.microsoft.com/office/powerpoint/2010/main" val="2969850233"/>
+        <p14:creationId xmlns:p14="http://schemas.microsoft.com/office/powerpoint/2010/main" val="3715276896"/>
       </p:ext>
     </p:extLst>
   </p:cSld>
@@ -10820,6 +9789,349 @@
             <a:fld id="{7022FF3C-310F-4809-A5BE-BC5BA8AA108D}" type="slidenum">
               <a:rPr lang="en-US" smtClean="0"/>
               <a:t>11</a:t>
+            </a:fld>
+            <a:endParaRPr lang="en-US"/>
+          </a:p>
+        </p:txBody>
+      </p:sp>
+      <p:sp>
+        <p:nvSpPr>
+          <p:cNvPr id="3" name="Content Placeholder 2"/>
+          <p:cNvSpPr>
+            <a:spLocks noGrp="1"/>
+          </p:cNvSpPr>
+          <p:nvPr>
+            <p:ph idx="1"/>
+          </p:nvPr>
+        </p:nvSpPr>
+        <p:spPr>
+          <a:xfrm>
+            <a:off x="457200" y="1181100"/>
+            <a:ext cx="8229600" cy="4945063"/>
+          </a:xfrm>
+        </p:spPr>
+        <p:txBody>
+          <a:bodyPr>
+            <a:normAutofit fontScale="85000" lnSpcReduction="20000"/>
+          </a:bodyPr>
+          <a:lstStyle/>
+          <a:p>
+            <a:r>
+              <a:rPr lang="en-US" dirty="0"/>
+              <a:t>Used </a:t>
+            </a:r>
+            <a:r>
+              <a:rPr lang="en-US" dirty="0" err="1" smtClean="0">
+                <a:latin typeface="Courier" pitchFamily="49" charset="0"/>
+              </a:rPr>
+              <a:t>klaR</a:t>
+            </a:r>
+            <a:r>
+              <a:rPr lang="en-US" dirty="0" smtClean="0"/>
+              <a:t> package in , which has a </a:t>
+            </a:r>
+            <a:r>
+              <a:rPr lang="en-US" dirty="0" err="1" smtClean="0">
+                <a:latin typeface="Courier" pitchFamily="49" charset="0"/>
+              </a:rPr>
+              <a:t>kmodes</a:t>
+            </a:r>
+            <a:r>
+              <a:rPr lang="en-US" dirty="0" smtClean="0"/>
+              <a:t> function to run k-modes analysis</a:t>
+            </a:r>
+          </a:p>
+          <a:p>
+            <a:r>
+              <a:rPr lang="en-US" dirty="0" smtClean="0"/>
+              <a:t>Output:</a:t>
+            </a:r>
+          </a:p>
+          <a:p>
+            <a:pPr lvl="1"/>
+            <a:r>
+              <a:rPr lang="en-US" dirty="0"/>
+              <a:t>cluster </a:t>
+            </a:r>
+            <a:r>
+              <a:rPr lang="en-US" dirty="0" smtClean="0"/>
+              <a:t>– A </a:t>
+            </a:r>
+            <a:r>
+              <a:rPr lang="en-US" dirty="0"/>
+              <a:t>vector of integers indicating the cluster to which each object is allocated.</a:t>
+            </a:r>
+          </a:p>
+          <a:p>
+            <a:pPr lvl="1"/>
+            <a:r>
+              <a:rPr lang="en-US" dirty="0"/>
+              <a:t>size </a:t>
+            </a:r>
+            <a:r>
+              <a:rPr lang="en-US" dirty="0" smtClean="0"/>
+              <a:t>– The </a:t>
+            </a:r>
+            <a:r>
+              <a:rPr lang="en-US" dirty="0"/>
+              <a:t>number of objects in each cluster.</a:t>
+            </a:r>
+          </a:p>
+          <a:p>
+            <a:pPr lvl="1"/>
+            <a:r>
+              <a:rPr lang="en-US" dirty="0"/>
+              <a:t>modes </a:t>
+            </a:r>
+            <a:r>
+              <a:rPr lang="en-US" dirty="0" smtClean="0"/>
+              <a:t>– A </a:t>
+            </a:r>
+            <a:r>
+              <a:rPr lang="en-US" dirty="0"/>
+              <a:t>matrix of cluster modes.</a:t>
+            </a:r>
+          </a:p>
+          <a:p>
+            <a:pPr lvl="1"/>
+            <a:r>
+              <a:rPr lang="en-US" dirty="0" err="1"/>
+              <a:t>withindiff</a:t>
+            </a:r>
+            <a:r>
+              <a:rPr lang="en-US" dirty="0"/>
+              <a:t> </a:t>
+            </a:r>
+            <a:r>
+              <a:rPr lang="en-US" dirty="0" smtClean="0"/>
+              <a:t>– The </a:t>
+            </a:r>
+            <a:r>
+              <a:rPr lang="en-US" dirty="0"/>
+              <a:t>within-cluster simple-matching distance for each cluster.</a:t>
+            </a:r>
+          </a:p>
+          <a:p>
+            <a:pPr lvl="1"/>
+            <a:r>
+              <a:rPr lang="en-US" dirty="0"/>
+              <a:t>iterations </a:t>
+            </a:r>
+            <a:r>
+              <a:rPr lang="en-US" dirty="0" smtClean="0"/>
+              <a:t>– The </a:t>
+            </a:r>
+            <a:r>
+              <a:rPr lang="en-US" dirty="0"/>
+              <a:t>number of iterations the algorithm has run.</a:t>
+            </a:r>
+          </a:p>
+          <a:p>
+            <a:pPr lvl="1"/>
+            <a:r>
+              <a:rPr lang="en-US" dirty="0"/>
+              <a:t>weighted </a:t>
+            </a:r>
+            <a:r>
+              <a:rPr lang="en-US" dirty="0" smtClean="0"/>
+              <a:t>– Whether </a:t>
+            </a:r>
+            <a:r>
+              <a:rPr lang="en-US" dirty="0"/>
+              <a:t>weighted distances were used or not.</a:t>
+            </a:r>
+          </a:p>
+        </p:txBody>
+      </p:sp>
+      <p:sp>
+        <p:nvSpPr>
+          <p:cNvPr id="4" name="Title 3"/>
+          <p:cNvSpPr>
+            <a:spLocks noGrp="1"/>
+          </p:cNvSpPr>
+          <p:nvPr>
+            <p:ph type="title"/>
+          </p:nvPr>
+        </p:nvSpPr>
+        <p:spPr/>
+        <p:txBody>
+          <a:bodyPr/>
+          <a:lstStyle/>
+          <a:p>
+            <a:r>
+              <a:rPr lang="en-US" dirty="0" smtClean="0"/>
+              <a:t>R methodology</a:t>
+            </a:r>
+            <a:endParaRPr lang="en-US" dirty="0"/>
+          </a:p>
+        </p:txBody>
+      </p:sp>
+    </p:spTree>
+    <p:extLst>
+      <p:ext uri="{BB962C8B-B14F-4D97-AF65-F5344CB8AC3E}">
+        <p14:creationId xmlns:p14="http://schemas.microsoft.com/office/powerpoint/2010/main" val="2992249715"/>
+      </p:ext>
+    </p:extLst>
+  </p:cSld>
+  <p:clrMapOvr>
+    <a:masterClrMapping/>
+  </p:clrMapOvr>
+</p:sld>
+</file>
+
+<file path=ppt/slides/slide12.xml><?xml version="1.0" encoding="utf-8"?>
+<p:sld xmlns:a="http://schemas.openxmlformats.org/drawingml/2006/main" xmlns:r="http://schemas.openxmlformats.org/officeDocument/2006/relationships" xmlns:p="http://schemas.openxmlformats.org/presentationml/2006/main">
+  <p:cSld>
+    <p:spTree>
+      <p:nvGrpSpPr>
+        <p:cNvPr id="1" name=""/>
+        <p:cNvGrpSpPr/>
+        <p:nvPr/>
+      </p:nvGrpSpPr>
+      <p:grpSpPr>
+        <a:xfrm>
+          <a:off x="0" y="0"/>
+          <a:ext cx="0" cy="0"/>
+          <a:chOff x="0" y="0"/>
+          <a:chExt cx="0" cy="0"/>
+        </a:xfrm>
+      </p:grpSpPr>
+      <p:sp>
+        <p:nvSpPr>
+          <p:cNvPr id="2" name="Slide Number Placeholder 1"/>
+          <p:cNvSpPr>
+            <a:spLocks noGrp="1"/>
+          </p:cNvSpPr>
+          <p:nvPr>
+            <p:ph type="sldNum" sz="quarter" idx="10"/>
+          </p:nvPr>
+        </p:nvSpPr>
+        <p:spPr/>
+        <p:txBody>
+          <a:bodyPr/>
+          <a:lstStyle/>
+          <a:p>
+            <a:fld id="{7022FF3C-310F-4809-A5BE-BC5BA8AA108D}" type="slidenum">
+              <a:rPr lang="en-US" smtClean="0"/>
+              <a:t>12</a:t>
+            </a:fld>
+            <a:endParaRPr lang="en-US"/>
+          </a:p>
+        </p:txBody>
+      </p:sp>
+      <p:sp>
+        <p:nvSpPr>
+          <p:cNvPr id="3" name="Content Placeholder 2"/>
+          <p:cNvSpPr>
+            <a:spLocks noGrp="1"/>
+          </p:cNvSpPr>
+          <p:nvPr>
+            <p:ph idx="1"/>
+          </p:nvPr>
+        </p:nvSpPr>
+        <p:spPr>
+          <a:xfrm>
+            <a:off x="457200" y="1228726"/>
+            <a:ext cx="8229600" cy="4897438"/>
+          </a:xfrm>
+        </p:spPr>
+        <p:txBody>
+          <a:bodyPr/>
+          <a:lstStyle/>
+          <a:p>
+            <a:r>
+              <a:rPr lang="en-US" dirty="0" smtClean="0"/>
+              <a:t>How to visualize clusters with categorical data?</a:t>
+            </a:r>
+          </a:p>
+          <a:p>
+            <a:pPr lvl="1"/>
+            <a:r>
+              <a:rPr lang="en-US" dirty="0" smtClean="0"/>
+              <a:t>So far, all clustering visualizations require numerical data</a:t>
+            </a:r>
+          </a:p>
+          <a:p>
+            <a:pPr lvl="1"/>
+            <a:r>
+              <a:rPr lang="en-US" dirty="0" smtClean="0"/>
+              <a:t>Difficult to find information on creating elbow and silhouette graphs with categorical clusters</a:t>
+            </a:r>
+            <a:endParaRPr lang="en-US" dirty="0"/>
+          </a:p>
+        </p:txBody>
+      </p:sp>
+      <p:sp>
+        <p:nvSpPr>
+          <p:cNvPr id="4" name="Title 3"/>
+          <p:cNvSpPr>
+            <a:spLocks noGrp="1"/>
+          </p:cNvSpPr>
+          <p:nvPr>
+            <p:ph type="title"/>
+          </p:nvPr>
+        </p:nvSpPr>
+        <p:spPr/>
+        <p:txBody>
+          <a:bodyPr/>
+          <a:lstStyle/>
+          <a:p>
+            <a:r>
+              <a:rPr lang="en-US" dirty="0" smtClean="0"/>
+              <a:t>New Questions</a:t>
+            </a:r>
+            <a:endParaRPr lang="en-US" dirty="0"/>
+          </a:p>
+        </p:txBody>
+      </p:sp>
+    </p:spTree>
+    <p:extLst>
+      <p:ext uri="{BB962C8B-B14F-4D97-AF65-F5344CB8AC3E}">
+        <p14:creationId xmlns:p14="http://schemas.microsoft.com/office/powerpoint/2010/main" val="2969850233"/>
+      </p:ext>
+    </p:extLst>
+  </p:cSld>
+  <p:clrMapOvr>
+    <a:masterClrMapping/>
+  </p:clrMapOvr>
+</p:sld>
+</file>
+
+<file path=ppt/slides/slide13.xml><?xml version="1.0" encoding="utf-8"?>
+<p:sld xmlns:a="http://schemas.openxmlformats.org/drawingml/2006/main" xmlns:r="http://schemas.openxmlformats.org/officeDocument/2006/relationships" xmlns:p="http://schemas.openxmlformats.org/presentationml/2006/main">
+  <p:cSld>
+    <p:spTree>
+      <p:nvGrpSpPr>
+        <p:cNvPr id="1" name=""/>
+        <p:cNvGrpSpPr/>
+        <p:nvPr/>
+      </p:nvGrpSpPr>
+      <p:grpSpPr>
+        <a:xfrm>
+          <a:off x="0" y="0"/>
+          <a:ext cx="0" cy="0"/>
+          <a:chOff x="0" y="0"/>
+          <a:chExt cx="0" cy="0"/>
+        </a:xfrm>
+      </p:grpSpPr>
+      <p:sp>
+        <p:nvSpPr>
+          <p:cNvPr id="2" name="Slide Number Placeholder 1"/>
+          <p:cNvSpPr>
+            <a:spLocks noGrp="1"/>
+          </p:cNvSpPr>
+          <p:nvPr>
+            <p:ph type="sldNum" sz="quarter" idx="10"/>
+          </p:nvPr>
+        </p:nvSpPr>
+        <p:spPr/>
+        <p:txBody>
+          <a:bodyPr/>
+          <a:lstStyle/>
+          <a:p>
+            <a:fld id="{7022FF3C-310F-4809-A5BE-BC5BA8AA108D}" type="slidenum">
+              <a:rPr lang="en-US" smtClean="0"/>
+              <a:t>13</a:t>
             </a:fld>
             <a:endParaRPr lang="en-US"/>
           </a:p>
@@ -10957,11 +10269,7 @@
           <a:p>
             <a:r>
               <a:rPr lang="en-US" dirty="0" smtClean="0"/>
-              <a:t>How </a:t>
-            </a:r>
-            <a:r>
-              <a:rPr lang="en-US" dirty="0" smtClean="0"/>
-              <a:t>do we identify groups of providers who have a history of severe outcomes, and thus who pose the greatest “risk” to the Medicare Trust Fund?</a:t>
+              <a:t>How do we identify groups of providers who have a history of severe outcomes, and thus who pose the greatest “risk” to the Medicare Trust Fund?</a:t>
             </a:r>
           </a:p>
           <a:p>
@@ -11485,78 +10793,35 @@
           </a:p>
         </p:txBody>
       </p:sp>
-      <p:sp>
-        <p:nvSpPr>
-          <p:cNvPr id="3" name="Content Placeholder 2"/>
-          <p:cNvSpPr>
-            <a:spLocks noGrp="1"/>
-          </p:cNvSpPr>
+      <p:pic>
+        <p:nvPicPr>
+          <p:cNvPr id="5" name="Content Placeholder 4"/>
+          <p:cNvPicPr>
+            <a:picLocks noGrp="1" noChangeAspect="1"/>
+          </p:cNvPicPr>
           <p:nvPr>
             <p:ph idx="1"/>
           </p:nvPr>
-        </p:nvSpPr>
+        </p:nvPicPr>
+        <p:blipFill>
+          <a:blip r:embed="rId2">
+            <a:extLst>
+              <a:ext uri="{28A0092B-C50C-407E-A947-70E740481C1C}">
+                <a14:useLocalDpi xmlns:a14="http://schemas.microsoft.com/office/drawing/2010/main" val="0"/>
+              </a:ext>
+            </a:extLst>
+          </a:blip>
+          <a:stretch>
+            <a:fillRect/>
+          </a:stretch>
+        </p:blipFill>
         <p:spPr>
           <a:xfrm>
-            <a:off x="457200" y="1289154"/>
-            <a:ext cx="8229600" cy="4837009"/>
+            <a:off x="847619" y="1444360"/>
+            <a:ext cx="7448762" cy="4297363"/>
           </a:xfrm>
         </p:spPr>
-        <p:txBody>
-          <a:bodyPr>
-            <a:normAutofit fontScale="85000" lnSpcReduction="10000"/>
-          </a:bodyPr>
-          <a:lstStyle/>
-          <a:p>
-            <a:r>
-              <a:rPr lang="en-US" dirty="0" smtClean="0"/>
-              <a:t>Method: k-mode clustering analysis where  k = 5</a:t>
-            </a:r>
-          </a:p>
-          <a:p>
-            <a:pPr lvl="1"/>
-            <a:r>
-              <a:rPr lang="en-US" dirty="0" smtClean="0"/>
-              <a:t>Similar to k-means, but best method for clustering categorical data</a:t>
-            </a:r>
-          </a:p>
-          <a:p>
-            <a:pPr lvl="1"/>
-            <a:r>
-              <a:rPr lang="en-US" dirty="0"/>
-              <a:t>“The data given by </a:t>
-            </a:r>
-            <a:r>
-              <a:rPr lang="en-US" dirty="0">
-                <a:latin typeface="Courier" pitchFamily="49" charset="0"/>
-              </a:rPr>
-              <a:t>data</a:t>
-            </a:r>
-            <a:r>
-              <a:rPr lang="en-US" dirty="0"/>
-              <a:t> is clustered by the k-modes method (Huang, 1997) which aims to partition the objects into k groups such that the distance from objects to the assigned cluster modes is minimized</a:t>
-            </a:r>
-            <a:r>
-              <a:rPr lang="en-US" dirty="0" smtClean="0"/>
-              <a:t>.” </a:t>
-            </a:r>
-            <a:endParaRPr lang="en-US" dirty="0" smtClean="0"/>
-          </a:p>
-          <a:p>
-            <a:r>
-              <a:rPr lang="en-US" dirty="0" smtClean="0"/>
-              <a:t>2 ways to impute NA values: impute with mode (most common category) or create third factor with NA values</a:t>
-            </a:r>
-          </a:p>
-          <a:p>
-            <a:pPr lvl="1"/>
-            <a:r>
-              <a:rPr lang="en-US" dirty="0" smtClean="0"/>
-              <a:t>Chose to create third factor of “NA” for data, as many of my categories were binary</a:t>
-            </a:r>
-            <a:endParaRPr lang="en-US" dirty="0"/>
-          </a:p>
-        </p:txBody>
-      </p:sp>
+      </p:pic>
       <p:sp>
         <p:nvSpPr>
           <p:cNvPr id="4" name="Title 3"/>
@@ -11573,17 +10838,17 @@
           <a:lstStyle/>
           <a:p>
             <a:r>
-              <a:rPr lang="en-US" dirty="0" smtClean="0"/>
-              <a:t>Capstone Analysis Strategy</a:t>
-            </a:r>
-            <a:endParaRPr lang="en-US" dirty="0"/>
+              <a:rPr lang="en-US" sz="3400" dirty="0" smtClean="0"/>
+              <a:t>Distribution of Overpayments for Part A Providers</a:t>
+            </a:r>
+            <a:endParaRPr lang="en-US" sz="3400" dirty="0"/>
           </a:p>
         </p:txBody>
       </p:sp>
     </p:spTree>
     <p:extLst>
       <p:ext uri="{BB962C8B-B14F-4D97-AF65-F5344CB8AC3E}">
-        <p14:creationId xmlns:p14="http://schemas.microsoft.com/office/powerpoint/2010/main" val="1299034812"/>
+        <p14:creationId xmlns:p14="http://schemas.microsoft.com/office/powerpoint/2010/main" val="3158526430"/>
       </p:ext>
     </p:extLst>
   </p:cSld>
@@ -11635,68 +10900,6 @@
       </p:sp>
       <p:sp>
         <p:nvSpPr>
-          <p:cNvPr id="3" name="Content Placeholder 2"/>
-          <p:cNvSpPr>
-            <a:spLocks noGrp="1"/>
-          </p:cNvSpPr>
-          <p:nvPr>
-            <p:ph idx="1"/>
-          </p:nvPr>
-        </p:nvSpPr>
-        <p:spPr>
-          <a:xfrm>
-            <a:off x="457200" y="1343026"/>
-            <a:ext cx="8229600" cy="4783138"/>
-          </a:xfrm>
-        </p:spPr>
-        <p:txBody>
-          <a:bodyPr/>
-          <a:lstStyle/>
-          <a:p>
-            <a:r>
-              <a:rPr lang="en-US" dirty="0" smtClean="0"/>
-              <a:t>Original dataset had over 30 columns, largely identifiers – dropped from dataset</a:t>
-            </a:r>
-          </a:p>
-          <a:p>
-            <a:r>
-              <a:rPr lang="en-US" dirty="0" smtClean="0"/>
-              <a:t>Converted </a:t>
-            </a:r>
-            <a:r>
-              <a:rPr lang="en-US" dirty="0"/>
-              <a:t>NPI to character instead of </a:t>
-            </a:r>
-            <a:r>
-              <a:rPr lang="en-US" dirty="0" smtClean="0"/>
-              <a:t>factor, as this is the data key/identifier</a:t>
-            </a:r>
-          </a:p>
-          <a:p>
-            <a:r>
-              <a:rPr lang="en-US" dirty="0" smtClean="0"/>
-              <a:t>Removed invalid NPIs </a:t>
-            </a:r>
-            <a:r>
-              <a:rPr lang="en-US" dirty="0"/>
-              <a:t>that do not have 10 digits, do not lead with 1, have dashes in </a:t>
-            </a:r>
-            <a:r>
-              <a:rPr lang="en-US" dirty="0" smtClean="0"/>
-              <a:t>them</a:t>
-            </a:r>
-          </a:p>
-          <a:p>
-            <a:r>
-              <a:rPr lang="en-US" dirty="0" smtClean="0"/>
-              <a:t>Convert numerical categories to factors (e.g., Claim Type = 0, 1, 2, 3, or 4)</a:t>
-            </a:r>
-            <a:endParaRPr lang="en-US" dirty="0"/>
-          </a:p>
-        </p:txBody>
-      </p:sp>
-      <p:sp>
-        <p:nvSpPr>
           <p:cNvPr id="4" name="Title 3"/>
           <p:cNvSpPr>
             <a:spLocks noGrp="1"/>
@@ -11711,17 +10914,46 @@
           <a:lstStyle/>
           <a:p>
             <a:r>
-              <a:rPr lang="en-US" dirty="0" smtClean="0"/>
-              <a:t>Transformation of Data</a:t>
-            </a:r>
-            <a:endParaRPr lang="en-US" dirty="0"/>
+              <a:rPr lang="en-US" sz="3400" dirty="0" smtClean="0"/>
+              <a:t>Distribution of Overpayments for Part B Providers</a:t>
+            </a:r>
+            <a:endParaRPr lang="en-US" sz="3400" dirty="0"/>
           </a:p>
         </p:txBody>
       </p:sp>
+      <p:pic>
+        <p:nvPicPr>
+          <p:cNvPr id="6" name="Content Placeholder 5"/>
+          <p:cNvPicPr>
+            <a:picLocks noGrp="1" noChangeAspect="1"/>
+          </p:cNvPicPr>
+          <p:nvPr>
+            <p:ph idx="1"/>
+          </p:nvPr>
+        </p:nvPicPr>
+        <p:blipFill>
+          <a:blip r:embed="rId2">
+            <a:extLst>
+              <a:ext uri="{28A0092B-C50C-407E-A947-70E740481C1C}">
+                <a14:useLocalDpi xmlns:a14="http://schemas.microsoft.com/office/drawing/2010/main" val="0"/>
+              </a:ext>
+            </a:extLst>
+          </a:blip>
+          <a:stretch>
+            <a:fillRect/>
+          </a:stretch>
+        </p:blipFill>
+        <p:spPr>
+          <a:xfrm>
+            <a:off x="847619" y="1514475"/>
+            <a:ext cx="7448762" cy="4297363"/>
+          </a:xfrm>
+        </p:spPr>
+      </p:pic>
     </p:spTree>
     <p:extLst>
       <p:ext uri="{BB962C8B-B14F-4D97-AF65-F5344CB8AC3E}">
-        <p14:creationId xmlns:p14="http://schemas.microsoft.com/office/powerpoint/2010/main" val="312297707"/>
+        <p14:creationId xmlns:p14="http://schemas.microsoft.com/office/powerpoint/2010/main" val="3183302922"/>
       </p:ext>
     </p:extLst>
   </p:cSld>
@@ -11783,56 +11015,60 @@
         </p:nvSpPr>
         <p:spPr>
           <a:xfrm>
-            <a:off x="457200" y="1352550"/>
-            <a:ext cx="8229600" cy="4773613"/>
+            <a:off x="457200" y="1289154"/>
+            <a:ext cx="8229600" cy="4837009"/>
           </a:xfrm>
         </p:spPr>
         <p:txBody>
-          <a:bodyPr/>
+          <a:bodyPr>
+            <a:normAutofit fontScale="85000" lnSpcReduction="10000"/>
+          </a:bodyPr>
           <a:lstStyle/>
           <a:p>
             <a:r>
               <a:rPr lang="en-US" dirty="0" smtClean="0"/>
-              <a:t>Action records were either blank or populated with record name</a:t>
+              <a:t>Method: k-mode clustering analysis where  k = 5</a:t>
             </a:r>
           </a:p>
           <a:p>
             <a:pPr lvl="1"/>
             <a:r>
               <a:rPr lang="en-US" dirty="0" smtClean="0"/>
-              <a:t>Used </a:t>
-            </a:r>
-            <a:r>
-              <a:rPr lang="en-US" dirty="0" err="1" smtClean="0">
+              <a:t>Similar to k-means, but best method for clustering categorical data</a:t>
+            </a:r>
+          </a:p>
+          <a:p>
+            <a:pPr lvl="1"/>
+            <a:r>
+              <a:rPr lang="en-US" dirty="0"/>
+              <a:t>“The data given by </a:t>
+            </a:r>
+            <a:r>
+              <a:rPr lang="en-US" dirty="0">
                 <a:latin typeface="Courier" pitchFamily="49" charset="0"/>
               </a:rPr>
-              <a:t>ifthen</a:t>
+              <a:t>data</a:t>
+            </a:r>
+            <a:r>
+              <a:rPr lang="en-US" dirty="0"/>
+              <a:t> is clustered by the k-modes method (Huang, 1997) which aims to partition the objects into k groups such that the distance from objects to the assigned cluster modes is minimized</a:t>
             </a:r>
             <a:r>
               <a:rPr lang="en-US" dirty="0" smtClean="0"/>
-              <a:t> statement to create </a:t>
-            </a:r>
-            <a:r>
-              <a:rPr lang="en-US" dirty="0"/>
-              <a:t>indicator variables for action records </a:t>
-            </a:r>
+              <a:t>.” </a:t>
+            </a:r>
+          </a:p>
+          <a:p>
             <a:r>
               <a:rPr lang="en-US" dirty="0" smtClean="0"/>
-              <a:t>(“Yes”/“No”)</a:t>
-            </a:r>
-          </a:p>
-          <a:p>
+              <a:t>2 ways to impute NA values: impute with mode (most common category) or create third factor with NA values</a:t>
+            </a:r>
+          </a:p>
+          <a:p>
+            <a:pPr lvl="1"/>
             <a:r>
               <a:rPr lang="en-US" dirty="0" smtClean="0"/>
-              <a:t>Imputed NA </a:t>
-            </a:r>
-            <a:r>
-              <a:rPr lang="en-US" dirty="0"/>
-              <a:t>variables for categorical data with </a:t>
-            </a:r>
-            <a:r>
-              <a:rPr lang="en-US" dirty="0" smtClean="0"/>
-              <a:t>a separate “None” factor</a:t>
+              <a:t>Chose to create third factor of “NA” for data, as many of my categories were binary</a:t>
             </a:r>
             <a:endParaRPr lang="en-US" dirty="0"/>
           </a:p>
@@ -11854,12 +11090,8 @@
           <a:lstStyle/>
           <a:p>
             <a:r>
-              <a:rPr lang="en-US" dirty="0"/>
-              <a:t>Transformation of </a:t>
-            </a:r>
-            <a:r>
               <a:rPr lang="en-US" dirty="0" smtClean="0"/>
-              <a:t>Data (cont.)</a:t>
+              <a:t>Capstone Analysis Strategy</a:t>
             </a:r>
             <a:endParaRPr lang="en-US" dirty="0"/>
           </a:p>
@@ -11868,7 +11100,7 @@
     </p:spTree>
     <p:extLst>
       <p:ext uri="{BB962C8B-B14F-4D97-AF65-F5344CB8AC3E}">
-        <p14:creationId xmlns:p14="http://schemas.microsoft.com/office/powerpoint/2010/main" val="3715276896"/>
+        <p14:creationId xmlns:p14="http://schemas.microsoft.com/office/powerpoint/2010/main" val="1299034812"/>
       </p:ext>
     </p:extLst>
   </p:cSld>
@@ -11930,139 +11162,51 @@
         </p:nvSpPr>
         <p:spPr>
           <a:xfrm>
-            <a:off x="457200" y="1181100"/>
-            <a:ext cx="8229600" cy="4945063"/>
+            <a:off x="457200" y="1343026"/>
+            <a:ext cx="8229600" cy="4783138"/>
           </a:xfrm>
         </p:spPr>
         <p:txBody>
-          <a:bodyPr>
-            <a:normAutofit fontScale="85000" lnSpcReduction="20000"/>
-          </a:bodyPr>
+          <a:bodyPr/>
           <a:lstStyle/>
           <a:p>
             <a:r>
+              <a:rPr lang="en-US" dirty="0" smtClean="0"/>
+              <a:t>Original dataset had over 30 columns, largely identifiers – dropped from dataset</a:t>
+            </a:r>
+          </a:p>
+          <a:p>
+            <a:r>
+              <a:rPr lang="en-US" dirty="0" smtClean="0"/>
+              <a:t>Converted </a:t>
+            </a:r>
+            <a:r>
               <a:rPr lang="en-US" dirty="0"/>
-              <a:t>Used </a:t>
-            </a:r>
-            <a:r>
-              <a:rPr lang="en-US" dirty="0" err="1" smtClean="0">
-                <a:latin typeface="Courier" pitchFamily="49" charset="0"/>
-              </a:rPr>
-              <a:t>klaR</a:t>
+              <a:t>NPI to character instead of </a:t>
             </a:r>
             <a:r>
               <a:rPr lang="en-US" dirty="0" smtClean="0"/>
-              <a:t> package in , which has a </a:t>
-            </a:r>
-            <a:r>
-              <a:rPr lang="en-US" dirty="0" err="1" smtClean="0">
-                <a:latin typeface="Courier" pitchFamily="49" charset="0"/>
-              </a:rPr>
-              <a:t>kmodes</a:t>
-            </a:r>
+              <a:t>factor, as this is the data key/identifier</a:t>
+            </a:r>
+          </a:p>
+          <a:p>
             <a:r>
               <a:rPr lang="en-US" dirty="0" smtClean="0"/>
-              <a:t> function to run k-modes analysis</a:t>
-            </a:r>
-          </a:p>
-          <a:p>
+              <a:t>Removed invalid NPIs </a:t>
+            </a:r>
+            <a:r>
+              <a:rPr lang="en-US" dirty="0"/>
+              <a:t>that do not have 10 digits, do not lead with 1, have dashes in </a:t>
+            </a:r>
             <a:r>
               <a:rPr lang="en-US" dirty="0" smtClean="0"/>
-              <a:t>Output:</a:t>
-            </a:r>
-          </a:p>
-          <a:p>
-            <a:pPr lvl="1"/>
-            <a:r>
-              <a:rPr lang="en-US" dirty="0"/>
-              <a:t>cluster </a:t>
-            </a:r>
+              <a:t>them</a:t>
+            </a:r>
+          </a:p>
+          <a:p>
             <a:r>
               <a:rPr lang="en-US" dirty="0" smtClean="0"/>
-              <a:t>– A </a:t>
-            </a:r>
-            <a:r>
-              <a:rPr lang="en-US" dirty="0"/>
-              <a:t>vector of integers indicating the cluster to which each object is allocated.</a:t>
-            </a:r>
-          </a:p>
-          <a:p>
-            <a:pPr lvl="1"/>
-            <a:r>
-              <a:rPr lang="en-US" dirty="0"/>
-              <a:t>size </a:t>
-            </a:r>
-            <a:r>
-              <a:rPr lang="en-US" dirty="0" smtClean="0"/>
-              <a:t>– The </a:t>
-            </a:r>
-            <a:r>
-              <a:rPr lang="en-US" dirty="0"/>
-              <a:t>number of objects in each cluster.</a:t>
-            </a:r>
-          </a:p>
-          <a:p>
-            <a:pPr lvl="1"/>
-            <a:r>
-              <a:rPr lang="en-US" dirty="0"/>
-              <a:t>modes </a:t>
-            </a:r>
-            <a:r>
-              <a:rPr lang="en-US" dirty="0" smtClean="0"/>
-              <a:t>– A </a:t>
-            </a:r>
-            <a:r>
-              <a:rPr lang="en-US" dirty="0"/>
-              <a:t>matrix of cluster modes.</a:t>
-            </a:r>
-          </a:p>
-          <a:p>
-            <a:pPr lvl="1"/>
-            <a:r>
-              <a:rPr lang="en-US" dirty="0" err="1"/>
-              <a:t>withindiff</a:t>
-            </a:r>
-            <a:r>
-              <a:rPr lang="en-US" dirty="0"/>
-              <a:t> </a:t>
-            </a:r>
-            <a:r>
-              <a:rPr lang="en-US" dirty="0" smtClean="0"/>
-              <a:t>– The </a:t>
-            </a:r>
-            <a:r>
-              <a:rPr lang="en-US" dirty="0"/>
-              <a:t>within-cluster simple-matching distance for each cluster.</a:t>
-            </a:r>
-          </a:p>
-          <a:p>
-            <a:pPr lvl="1"/>
-            <a:r>
-              <a:rPr lang="en-US" dirty="0"/>
-              <a:t>iterations </a:t>
-            </a:r>
-            <a:r>
-              <a:rPr lang="en-US" dirty="0" smtClean="0"/>
-              <a:t>– The </a:t>
-            </a:r>
-            <a:r>
-              <a:rPr lang="en-US" dirty="0"/>
-              <a:t>number of iterations the algorithm has run.</a:t>
-            </a:r>
-          </a:p>
-          <a:p>
-            <a:pPr lvl="1"/>
-            <a:r>
-              <a:rPr lang="en-US" dirty="0"/>
-              <a:t>weighted </a:t>
-            </a:r>
-            <a:r>
-              <a:rPr lang="en-US" dirty="0" smtClean="0"/>
-              <a:t>– Whether </a:t>
-            </a:r>
-            <a:r>
-              <a:rPr lang="en-US" dirty="0"/>
-              <a:t>weighted distances were used or not.</a:t>
+              <a:t>Convert numerical categories to factors (e.g., Claim Type = 0, 1, 2, 3, or 4)</a:t>
             </a:r>
             <a:endParaRPr lang="en-US" dirty="0"/>
           </a:p>
@@ -12085,7 +11229,7 @@
           <a:p>
             <a:r>
               <a:rPr lang="en-US" dirty="0" smtClean="0"/>
-              <a:t>R methodology</a:t>
+              <a:t>Transformation of Data</a:t>
             </a:r>
             <a:endParaRPr lang="en-US" dirty="0"/>
           </a:p>
@@ -12094,7 +11238,7 @@
     </p:spTree>
     <p:extLst>
       <p:ext uri="{BB962C8B-B14F-4D97-AF65-F5344CB8AC3E}">
-        <p14:creationId xmlns:p14="http://schemas.microsoft.com/office/powerpoint/2010/main" val="2992249715"/>
+        <p14:creationId xmlns:p14="http://schemas.microsoft.com/office/powerpoint/2010/main" val="312297707"/>
       </p:ext>
     </p:extLst>
   </p:cSld>

</xml_diff>

<commit_message>
Updated cluster plot in slides
</commit_message>
<xml_diff>
--- a/20180802 Capstone Presentation.pptx
+++ b/20180802 Capstone Presentation.pptx
@@ -353,11 +353,11 @@
           <c:showBubbleSize val="0"/>
         </c:dLbls>
         <c:gapWidth val="150"/>
-        <c:axId val="427148520"/>
-        <c:axId val="427146952"/>
+        <c:axId val="452751960"/>
+        <c:axId val="452752744"/>
       </c:barChart>
       <c:catAx>
-        <c:axId val="427148520"/>
+        <c:axId val="452751960"/>
         <c:scaling>
           <c:orientation val="minMax"/>
         </c:scaling>
@@ -367,7 +367,7 @@
         <c:majorTickMark val="out"/>
         <c:minorTickMark val="none"/>
         <c:tickLblPos val="nextTo"/>
-        <c:crossAx val="427146952"/>
+        <c:crossAx val="452752744"/>
         <c:crosses val="autoZero"/>
         <c:auto val="1"/>
         <c:lblAlgn val="ctr"/>
@@ -375,7 +375,7 @@
         <c:noMultiLvlLbl val="0"/>
       </c:catAx>
       <c:valAx>
-        <c:axId val="427146952"/>
+        <c:axId val="452752744"/>
         <c:scaling>
           <c:orientation val="minMax"/>
         </c:scaling>
@@ -386,7 +386,7 @@
         <c:majorTickMark val="out"/>
         <c:minorTickMark val="none"/>
         <c:tickLblPos val="nextTo"/>
-        <c:crossAx val="427148520"/>
+        <c:crossAx val="452751960"/>
         <c:crosses val="autoZero"/>
         <c:crossBetween val="between"/>
       </c:valAx>
@@ -2863,6 +2863,1044 @@
       <dsp:cNvGrpSpPr/>
     </dsp:nvGrpSpPr>
     <dsp:grpSpPr/>
+    <dsp:sp modelId="{DFC0E9AC-9B82-41F1-BDE4-093D70DFCBCF}">
+      <dsp:nvSpPr>
+        <dsp:cNvPr id="0" name=""/>
+        <dsp:cNvSpPr/>
+      </dsp:nvSpPr>
+      <dsp:spPr>
+        <a:xfrm>
+          <a:off x="2590564" y="581522"/>
+          <a:ext cx="449071" cy="91440"/>
+        </a:xfrm>
+        <a:custGeom>
+          <a:avLst/>
+          <a:gdLst/>
+          <a:ahLst/>
+          <a:cxnLst/>
+          <a:rect l="0" t="0" r="0" b="0"/>
+          <a:pathLst>
+            <a:path>
+              <a:moveTo>
+                <a:pt x="0" y="45720"/>
+              </a:moveTo>
+              <a:lnTo>
+                <a:pt x="449071" y="45720"/>
+              </a:lnTo>
+            </a:path>
+          </a:pathLst>
+        </a:custGeom>
+        <a:noFill/>
+        <a:ln w="6350" cap="rnd" cmpd="sng" algn="ctr">
+          <a:solidFill>
+            <a:schemeClr val="accent1">
+              <a:hueOff val="0"/>
+              <a:satOff val="0"/>
+              <a:lumOff val="0"/>
+              <a:alphaOff val="0"/>
+            </a:schemeClr>
+          </a:solidFill>
+          <a:prstDash val="solid"/>
+          <a:tailEnd type="arrow"/>
+        </a:ln>
+        <a:effectLst/>
+      </dsp:spPr>
+      <dsp:style>
+        <a:lnRef idx="1">
+          <a:scrgbClr r="0" g="0" b="0"/>
+        </a:lnRef>
+        <a:fillRef idx="0">
+          <a:scrgbClr r="0" g="0" b="0"/>
+        </a:fillRef>
+        <a:effectRef idx="0">
+          <a:scrgbClr r="0" g="0" b="0"/>
+        </a:effectRef>
+        <a:fontRef idx="minor"/>
+      </dsp:style>
+      <dsp:txBody>
+        <a:bodyPr spcFirstLastPara="0" vert="horz" wrap="square" lIns="12700" tIns="0" rIns="12700" bIns="0" numCol="1" spcCol="1270" anchor="ctr" anchorCtr="0">
+          <a:noAutofit/>
+        </a:bodyPr>
+        <a:lstStyle/>
+        <a:p>
+          <a:pPr lvl="0" algn="ctr" defTabSz="222250">
+            <a:lnSpc>
+              <a:spcPct val="90000"/>
+            </a:lnSpc>
+            <a:spcBef>
+              <a:spcPct val="0"/>
+            </a:spcBef>
+            <a:spcAft>
+              <a:spcPct val="35000"/>
+            </a:spcAft>
+          </a:pPr>
+          <a:endParaRPr lang="en-US" sz="500" kern="1200"/>
+        </a:p>
+      </dsp:txBody>
+      <dsp:txXfrm>
+        <a:off x="2803108" y="624844"/>
+        <a:ext cx="23983" cy="4796"/>
+      </dsp:txXfrm>
+    </dsp:sp>
+    <dsp:sp modelId="{1BB52588-8617-4361-87B3-C2CC7705A59E}">
+      <dsp:nvSpPr>
+        <dsp:cNvPr id="0" name=""/>
+        <dsp:cNvSpPr/>
+      </dsp:nvSpPr>
+      <dsp:spPr>
+        <a:xfrm>
+          <a:off x="506835" y="1584"/>
+          <a:ext cx="2085528" cy="1251317"/>
+        </a:xfrm>
+        <a:prstGeom prst="rect">
+          <a:avLst/>
+        </a:prstGeom>
+        <a:solidFill>
+          <a:schemeClr val="accent2">
+            <a:lumMod val="75000"/>
+          </a:schemeClr>
+        </a:solidFill>
+        <a:ln w="48000" cap="flat" cmpd="thickThin" algn="ctr">
+          <a:solidFill>
+            <a:schemeClr val="lt1">
+              <a:hueOff val="0"/>
+              <a:satOff val="0"/>
+              <a:lumOff val="0"/>
+              <a:alphaOff val="0"/>
+            </a:schemeClr>
+          </a:solidFill>
+          <a:prstDash val="solid"/>
+        </a:ln>
+        <a:effectLst/>
+      </dsp:spPr>
+      <dsp:style>
+        <a:lnRef idx="2">
+          <a:scrgbClr r="0" g="0" b="0"/>
+        </a:lnRef>
+        <a:fillRef idx="1">
+          <a:scrgbClr r="0" g="0" b="0"/>
+        </a:fillRef>
+        <a:effectRef idx="0">
+          <a:scrgbClr r="0" g="0" b="0"/>
+        </a:effectRef>
+        <a:fontRef idx="minor">
+          <a:schemeClr val="lt1"/>
+        </a:fontRef>
+      </dsp:style>
+      <dsp:txBody>
+        <a:bodyPr spcFirstLastPara="0" vert="horz" wrap="square" lIns="149352" tIns="149352" rIns="149352" bIns="149352" numCol="1" spcCol="1270" anchor="ctr" anchorCtr="0">
+          <a:noAutofit/>
+        </a:bodyPr>
+        <a:lstStyle/>
+        <a:p>
+          <a:pPr lvl="0" algn="ctr" defTabSz="933450">
+            <a:lnSpc>
+              <a:spcPct val="90000"/>
+            </a:lnSpc>
+            <a:spcBef>
+              <a:spcPct val="0"/>
+            </a:spcBef>
+            <a:spcAft>
+              <a:spcPct val="35000"/>
+            </a:spcAft>
+          </a:pPr>
+          <a:r>
+            <a:rPr lang="en-US" sz="2100" kern="1200" baseline="0" dirty="0" smtClean="0">
+              <a:solidFill>
+                <a:schemeClr val="tx1"/>
+              </a:solidFill>
+            </a:rPr>
+            <a:t>Create dataset</a:t>
+          </a:r>
+          <a:endParaRPr lang="en-US" sz="2100" kern="1200" baseline="0" dirty="0">
+            <a:solidFill>
+              <a:schemeClr val="tx1"/>
+            </a:solidFill>
+          </a:endParaRPr>
+        </a:p>
+      </dsp:txBody>
+      <dsp:txXfrm>
+        <a:off x="506835" y="1584"/>
+        <a:ext cx="2085528" cy="1251317"/>
+      </dsp:txXfrm>
+    </dsp:sp>
+    <dsp:sp modelId="{9AA9DC35-418E-49F5-915E-FB5484DB561D}">
+      <dsp:nvSpPr>
+        <dsp:cNvPr id="0" name=""/>
+        <dsp:cNvSpPr/>
+      </dsp:nvSpPr>
+      <dsp:spPr>
+        <a:xfrm>
+          <a:off x="5155764" y="581522"/>
+          <a:ext cx="449071" cy="91440"/>
+        </a:xfrm>
+        <a:custGeom>
+          <a:avLst/>
+          <a:gdLst/>
+          <a:ahLst/>
+          <a:cxnLst/>
+          <a:rect l="0" t="0" r="0" b="0"/>
+          <a:pathLst>
+            <a:path>
+              <a:moveTo>
+                <a:pt x="0" y="45720"/>
+              </a:moveTo>
+              <a:lnTo>
+                <a:pt x="449071" y="45720"/>
+              </a:lnTo>
+            </a:path>
+          </a:pathLst>
+        </a:custGeom>
+        <a:noFill/>
+        <a:ln w="6350" cap="rnd" cmpd="sng" algn="ctr">
+          <a:solidFill>
+            <a:schemeClr val="accent1">
+              <a:hueOff val="0"/>
+              <a:satOff val="0"/>
+              <a:lumOff val="0"/>
+              <a:alphaOff val="0"/>
+            </a:schemeClr>
+          </a:solidFill>
+          <a:prstDash val="solid"/>
+          <a:tailEnd type="arrow"/>
+        </a:ln>
+        <a:effectLst/>
+      </dsp:spPr>
+      <dsp:style>
+        <a:lnRef idx="1">
+          <a:scrgbClr r="0" g="0" b="0"/>
+        </a:lnRef>
+        <a:fillRef idx="0">
+          <a:scrgbClr r="0" g="0" b="0"/>
+        </a:fillRef>
+        <a:effectRef idx="0">
+          <a:scrgbClr r="0" g="0" b="0"/>
+        </a:effectRef>
+        <a:fontRef idx="minor"/>
+      </dsp:style>
+      <dsp:txBody>
+        <a:bodyPr spcFirstLastPara="0" vert="horz" wrap="square" lIns="12700" tIns="0" rIns="12700" bIns="0" numCol="1" spcCol="1270" anchor="ctr" anchorCtr="0">
+          <a:noAutofit/>
+        </a:bodyPr>
+        <a:lstStyle/>
+        <a:p>
+          <a:pPr lvl="0" algn="ctr" defTabSz="222250">
+            <a:lnSpc>
+              <a:spcPct val="90000"/>
+            </a:lnSpc>
+            <a:spcBef>
+              <a:spcPct val="0"/>
+            </a:spcBef>
+            <a:spcAft>
+              <a:spcPct val="35000"/>
+            </a:spcAft>
+          </a:pPr>
+          <a:endParaRPr lang="en-US" sz="500" kern="1200"/>
+        </a:p>
+      </dsp:txBody>
+      <dsp:txXfrm>
+        <a:off x="5368308" y="624844"/>
+        <a:ext cx="23983" cy="4796"/>
+      </dsp:txXfrm>
+    </dsp:sp>
+    <dsp:sp modelId="{AD5B0578-AF72-41FC-9112-992F27B502F1}">
+      <dsp:nvSpPr>
+        <dsp:cNvPr id="0" name=""/>
+        <dsp:cNvSpPr/>
+      </dsp:nvSpPr>
+      <dsp:spPr>
+        <a:xfrm>
+          <a:off x="3072035" y="1584"/>
+          <a:ext cx="2085528" cy="1251317"/>
+        </a:xfrm>
+        <a:prstGeom prst="rect">
+          <a:avLst/>
+        </a:prstGeom>
+        <a:solidFill>
+          <a:schemeClr val="accent2">
+            <a:lumMod val="75000"/>
+          </a:schemeClr>
+        </a:solidFill>
+        <a:ln w="48000" cap="flat" cmpd="thickThin" algn="ctr">
+          <a:solidFill>
+            <a:schemeClr val="lt1">
+              <a:hueOff val="0"/>
+              <a:satOff val="0"/>
+              <a:lumOff val="0"/>
+              <a:alphaOff val="0"/>
+            </a:schemeClr>
+          </a:solidFill>
+          <a:prstDash val="solid"/>
+        </a:ln>
+        <a:effectLst/>
+      </dsp:spPr>
+      <dsp:style>
+        <a:lnRef idx="2">
+          <a:scrgbClr r="0" g="0" b="0"/>
+        </a:lnRef>
+        <a:fillRef idx="1">
+          <a:scrgbClr r="0" g="0" b="0"/>
+        </a:fillRef>
+        <a:effectRef idx="0">
+          <a:scrgbClr r="0" g="0" b="0"/>
+        </a:effectRef>
+        <a:fontRef idx="minor">
+          <a:schemeClr val="lt1"/>
+        </a:fontRef>
+      </dsp:style>
+      <dsp:txBody>
+        <a:bodyPr spcFirstLastPara="0" vert="horz" wrap="square" lIns="149352" tIns="149352" rIns="149352" bIns="149352" numCol="1" spcCol="1270" anchor="ctr" anchorCtr="0">
+          <a:noAutofit/>
+        </a:bodyPr>
+        <a:lstStyle/>
+        <a:p>
+          <a:pPr lvl="0" algn="ctr" defTabSz="933450">
+            <a:lnSpc>
+              <a:spcPct val="90000"/>
+            </a:lnSpc>
+            <a:spcBef>
+              <a:spcPct val="0"/>
+            </a:spcBef>
+            <a:spcAft>
+              <a:spcPct val="35000"/>
+            </a:spcAft>
+          </a:pPr>
+          <a:r>
+            <a:rPr lang="en-US" sz="2100" kern="1200" dirty="0" smtClean="0">
+              <a:solidFill>
+                <a:schemeClr val="tx1"/>
+              </a:solidFill>
+            </a:rPr>
+            <a:t>Clean and format data for analysis</a:t>
+          </a:r>
+          <a:endParaRPr lang="en-US" sz="2100" kern="1200" dirty="0">
+            <a:solidFill>
+              <a:schemeClr val="tx1"/>
+            </a:solidFill>
+          </a:endParaRPr>
+        </a:p>
+      </dsp:txBody>
+      <dsp:txXfrm>
+        <a:off x="3072035" y="1584"/>
+        <a:ext cx="2085528" cy="1251317"/>
+      </dsp:txXfrm>
+    </dsp:sp>
+    <dsp:sp modelId="{B64B2EBB-C71A-4A8B-8C6C-E475856548F3}">
+      <dsp:nvSpPr>
+        <dsp:cNvPr id="0" name=""/>
+        <dsp:cNvSpPr/>
+      </dsp:nvSpPr>
+      <dsp:spPr>
+        <a:xfrm>
+          <a:off x="1549599" y="1251101"/>
+          <a:ext cx="5130400" cy="449071"/>
+        </a:xfrm>
+        <a:custGeom>
+          <a:avLst/>
+          <a:gdLst/>
+          <a:ahLst/>
+          <a:cxnLst/>
+          <a:rect l="0" t="0" r="0" b="0"/>
+          <a:pathLst>
+            <a:path>
+              <a:moveTo>
+                <a:pt x="5130400" y="0"/>
+              </a:moveTo>
+              <a:lnTo>
+                <a:pt x="5130400" y="241635"/>
+              </a:lnTo>
+              <a:lnTo>
+                <a:pt x="0" y="241635"/>
+              </a:lnTo>
+              <a:lnTo>
+                <a:pt x="0" y="449071"/>
+              </a:lnTo>
+            </a:path>
+          </a:pathLst>
+        </a:custGeom>
+        <a:noFill/>
+        <a:ln w="6350" cap="rnd" cmpd="sng" algn="ctr">
+          <a:solidFill>
+            <a:schemeClr val="accent1">
+              <a:hueOff val="0"/>
+              <a:satOff val="0"/>
+              <a:lumOff val="0"/>
+              <a:alphaOff val="0"/>
+            </a:schemeClr>
+          </a:solidFill>
+          <a:prstDash val="solid"/>
+          <a:tailEnd type="arrow"/>
+        </a:ln>
+        <a:effectLst/>
+      </dsp:spPr>
+      <dsp:style>
+        <a:lnRef idx="1">
+          <a:scrgbClr r="0" g="0" b="0"/>
+        </a:lnRef>
+        <a:fillRef idx="0">
+          <a:scrgbClr r="0" g="0" b="0"/>
+        </a:fillRef>
+        <a:effectRef idx="0">
+          <a:scrgbClr r="0" g="0" b="0"/>
+        </a:effectRef>
+        <a:fontRef idx="minor"/>
+      </dsp:style>
+      <dsp:txBody>
+        <a:bodyPr spcFirstLastPara="0" vert="horz" wrap="square" lIns="12700" tIns="0" rIns="12700" bIns="0" numCol="1" spcCol="1270" anchor="ctr" anchorCtr="0">
+          <a:noAutofit/>
+        </a:bodyPr>
+        <a:lstStyle/>
+        <a:p>
+          <a:pPr lvl="0" algn="ctr" defTabSz="222250">
+            <a:lnSpc>
+              <a:spcPct val="90000"/>
+            </a:lnSpc>
+            <a:spcBef>
+              <a:spcPct val="0"/>
+            </a:spcBef>
+            <a:spcAft>
+              <a:spcPct val="35000"/>
+            </a:spcAft>
+          </a:pPr>
+          <a:endParaRPr lang="en-US" sz="500" kern="1200"/>
+        </a:p>
+      </dsp:txBody>
+      <dsp:txXfrm>
+        <a:off x="3985980" y="1473238"/>
+        <a:ext cx="257638" cy="4796"/>
+      </dsp:txXfrm>
+    </dsp:sp>
+    <dsp:sp modelId="{BEC7D7D3-F6F7-4E37-9CFA-857A2F8F14E4}">
+      <dsp:nvSpPr>
+        <dsp:cNvPr id="0" name=""/>
+        <dsp:cNvSpPr/>
+      </dsp:nvSpPr>
+      <dsp:spPr>
+        <a:xfrm>
+          <a:off x="5637235" y="1584"/>
+          <a:ext cx="2085528" cy="1251317"/>
+        </a:xfrm>
+        <a:prstGeom prst="rect">
+          <a:avLst/>
+        </a:prstGeom>
+        <a:solidFill>
+          <a:schemeClr val="accent2">
+            <a:lumMod val="75000"/>
+          </a:schemeClr>
+        </a:solidFill>
+        <a:ln w="48000" cap="flat" cmpd="thickThin" algn="ctr">
+          <a:solidFill>
+            <a:schemeClr val="lt1">
+              <a:hueOff val="0"/>
+              <a:satOff val="0"/>
+              <a:lumOff val="0"/>
+              <a:alphaOff val="0"/>
+            </a:schemeClr>
+          </a:solidFill>
+          <a:prstDash val="solid"/>
+        </a:ln>
+        <a:effectLst/>
+      </dsp:spPr>
+      <dsp:style>
+        <a:lnRef idx="2">
+          <a:scrgbClr r="0" g="0" b="0"/>
+        </a:lnRef>
+        <a:fillRef idx="1">
+          <a:scrgbClr r="0" g="0" b="0"/>
+        </a:fillRef>
+        <a:effectRef idx="0">
+          <a:scrgbClr r="0" g="0" b="0"/>
+        </a:effectRef>
+        <a:fontRef idx="minor">
+          <a:schemeClr val="lt1"/>
+        </a:fontRef>
+      </dsp:style>
+      <dsp:txBody>
+        <a:bodyPr spcFirstLastPara="0" vert="horz" wrap="square" lIns="149352" tIns="149352" rIns="149352" bIns="149352" numCol="1" spcCol="1270" anchor="ctr" anchorCtr="0">
+          <a:noAutofit/>
+        </a:bodyPr>
+        <a:lstStyle/>
+        <a:p>
+          <a:pPr lvl="0" algn="ctr" defTabSz="933450">
+            <a:lnSpc>
+              <a:spcPct val="90000"/>
+            </a:lnSpc>
+            <a:spcBef>
+              <a:spcPct val="0"/>
+            </a:spcBef>
+            <a:spcAft>
+              <a:spcPct val="35000"/>
+            </a:spcAft>
+          </a:pPr>
+          <a:r>
+            <a:rPr lang="en-US" sz="2100" kern="1200" dirty="0" smtClean="0">
+              <a:solidFill>
+                <a:schemeClr val="tx1"/>
+              </a:solidFill>
+            </a:rPr>
+            <a:t>Perform cluster analysis</a:t>
+          </a:r>
+          <a:endParaRPr lang="en-US" sz="2100" kern="1200" dirty="0">
+            <a:solidFill>
+              <a:schemeClr val="tx1"/>
+            </a:solidFill>
+          </a:endParaRPr>
+        </a:p>
+      </dsp:txBody>
+      <dsp:txXfrm>
+        <a:off x="5637235" y="1584"/>
+        <a:ext cx="2085528" cy="1251317"/>
+      </dsp:txXfrm>
+    </dsp:sp>
+    <dsp:sp modelId="{CD97B47E-8C6F-4B7D-9FAD-92A7193ED4BB}">
+      <dsp:nvSpPr>
+        <dsp:cNvPr id="0" name=""/>
+        <dsp:cNvSpPr/>
+      </dsp:nvSpPr>
+      <dsp:spPr>
+        <a:xfrm>
+          <a:off x="2590564" y="2312511"/>
+          <a:ext cx="449071" cy="91440"/>
+        </a:xfrm>
+        <a:custGeom>
+          <a:avLst/>
+          <a:gdLst/>
+          <a:ahLst/>
+          <a:cxnLst/>
+          <a:rect l="0" t="0" r="0" b="0"/>
+          <a:pathLst>
+            <a:path>
+              <a:moveTo>
+                <a:pt x="0" y="45720"/>
+              </a:moveTo>
+              <a:lnTo>
+                <a:pt x="449071" y="45720"/>
+              </a:lnTo>
+            </a:path>
+          </a:pathLst>
+        </a:custGeom>
+        <a:noFill/>
+        <a:ln w="6350" cap="rnd" cmpd="sng" algn="ctr">
+          <a:solidFill>
+            <a:schemeClr val="accent1">
+              <a:hueOff val="0"/>
+              <a:satOff val="0"/>
+              <a:lumOff val="0"/>
+              <a:alphaOff val="0"/>
+            </a:schemeClr>
+          </a:solidFill>
+          <a:prstDash val="solid"/>
+          <a:tailEnd type="arrow"/>
+        </a:ln>
+        <a:effectLst/>
+      </dsp:spPr>
+      <dsp:style>
+        <a:lnRef idx="1">
+          <a:scrgbClr r="0" g="0" b="0"/>
+        </a:lnRef>
+        <a:fillRef idx="0">
+          <a:scrgbClr r="0" g="0" b="0"/>
+        </a:fillRef>
+        <a:effectRef idx="0">
+          <a:scrgbClr r="0" g="0" b="0"/>
+        </a:effectRef>
+        <a:fontRef idx="minor"/>
+      </dsp:style>
+      <dsp:txBody>
+        <a:bodyPr spcFirstLastPara="0" vert="horz" wrap="square" lIns="12700" tIns="0" rIns="12700" bIns="0" numCol="1" spcCol="1270" anchor="ctr" anchorCtr="0">
+          <a:noAutofit/>
+        </a:bodyPr>
+        <a:lstStyle/>
+        <a:p>
+          <a:pPr lvl="0" algn="ctr" defTabSz="222250">
+            <a:lnSpc>
+              <a:spcPct val="90000"/>
+            </a:lnSpc>
+            <a:spcBef>
+              <a:spcPct val="0"/>
+            </a:spcBef>
+            <a:spcAft>
+              <a:spcPct val="35000"/>
+            </a:spcAft>
+          </a:pPr>
+          <a:endParaRPr lang="en-US" sz="500" kern="1200"/>
+        </a:p>
+      </dsp:txBody>
+      <dsp:txXfrm>
+        <a:off x="2803108" y="2355833"/>
+        <a:ext cx="23983" cy="4796"/>
+      </dsp:txXfrm>
+    </dsp:sp>
+    <dsp:sp modelId="{49EE1E55-CE67-42BC-A800-325C12A118A5}">
+      <dsp:nvSpPr>
+        <dsp:cNvPr id="0" name=""/>
+        <dsp:cNvSpPr/>
+      </dsp:nvSpPr>
+      <dsp:spPr>
+        <a:xfrm>
+          <a:off x="506835" y="1732572"/>
+          <a:ext cx="2085528" cy="1251317"/>
+        </a:xfrm>
+        <a:prstGeom prst="rect">
+          <a:avLst/>
+        </a:prstGeom>
+        <a:solidFill>
+          <a:schemeClr val="accent1">
+            <a:hueOff val="0"/>
+            <a:satOff val="0"/>
+            <a:lumOff val="0"/>
+            <a:alphaOff val="0"/>
+          </a:schemeClr>
+        </a:solidFill>
+        <a:ln w="48000" cap="flat" cmpd="thickThin" algn="ctr">
+          <a:solidFill>
+            <a:schemeClr val="lt1">
+              <a:hueOff val="0"/>
+              <a:satOff val="0"/>
+              <a:lumOff val="0"/>
+              <a:alphaOff val="0"/>
+            </a:schemeClr>
+          </a:solidFill>
+          <a:prstDash val="solid"/>
+        </a:ln>
+        <a:effectLst/>
+      </dsp:spPr>
+      <dsp:style>
+        <a:lnRef idx="2">
+          <a:scrgbClr r="0" g="0" b="0"/>
+        </a:lnRef>
+        <a:fillRef idx="1">
+          <a:scrgbClr r="0" g="0" b="0"/>
+        </a:fillRef>
+        <a:effectRef idx="0">
+          <a:scrgbClr r="0" g="0" b="0"/>
+        </a:effectRef>
+        <a:fontRef idx="minor">
+          <a:schemeClr val="lt1"/>
+        </a:fontRef>
+      </dsp:style>
+      <dsp:txBody>
+        <a:bodyPr spcFirstLastPara="0" vert="horz" wrap="square" lIns="149352" tIns="149352" rIns="149352" bIns="149352" numCol="1" spcCol="1270" anchor="ctr" anchorCtr="0">
+          <a:noAutofit/>
+        </a:bodyPr>
+        <a:lstStyle/>
+        <a:p>
+          <a:pPr lvl="0" algn="ctr" defTabSz="933450">
+            <a:lnSpc>
+              <a:spcPct val="90000"/>
+            </a:lnSpc>
+            <a:spcBef>
+              <a:spcPct val="0"/>
+            </a:spcBef>
+            <a:spcAft>
+              <a:spcPct val="35000"/>
+            </a:spcAft>
+          </a:pPr>
+          <a:r>
+            <a:rPr lang="en-US" sz="2100" kern="1200" dirty="0" smtClean="0"/>
+            <a:t>Visualize results</a:t>
+          </a:r>
+          <a:endParaRPr lang="en-US" sz="2100" kern="1200" dirty="0"/>
+        </a:p>
+      </dsp:txBody>
+      <dsp:txXfrm>
+        <a:off x="506835" y="1732572"/>
+        <a:ext cx="2085528" cy="1251317"/>
+      </dsp:txXfrm>
+    </dsp:sp>
+    <dsp:sp modelId="{1A3C7C85-CC4F-4DD3-99D8-E6C4C95C3D26}">
+      <dsp:nvSpPr>
+        <dsp:cNvPr id="0" name=""/>
+        <dsp:cNvSpPr/>
+      </dsp:nvSpPr>
+      <dsp:spPr>
+        <a:xfrm>
+          <a:off x="5155764" y="2312511"/>
+          <a:ext cx="449071" cy="91440"/>
+        </a:xfrm>
+        <a:custGeom>
+          <a:avLst/>
+          <a:gdLst/>
+          <a:ahLst/>
+          <a:cxnLst/>
+          <a:rect l="0" t="0" r="0" b="0"/>
+          <a:pathLst>
+            <a:path>
+              <a:moveTo>
+                <a:pt x="0" y="45720"/>
+              </a:moveTo>
+              <a:lnTo>
+                <a:pt x="449071" y="45720"/>
+              </a:lnTo>
+            </a:path>
+          </a:pathLst>
+        </a:custGeom>
+        <a:noFill/>
+        <a:ln w="6350" cap="rnd" cmpd="sng" algn="ctr">
+          <a:solidFill>
+            <a:schemeClr val="accent1">
+              <a:hueOff val="0"/>
+              <a:satOff val="0"/>
+              <a:lumOff val="0"/>
+              <a:alphaOff val="0"/>
+            </a:schemeClr>
+          </a:solidFill>
+          <a:prstDash val="solid"/>
+          <a:tailEnd type="arrow"/>
+        </a:ln>
+        <a:effectLst/>
+      </dsp:spPr>
+      <dsp:style>
+        <a:lnRef idx="1">
+          <a:scrgbClr r="0" g="0" b="0"/>
+        </a:lnRef>
+        <a:fillRef idx="0">
+          <a:scrgbClr r="0" g="0" b="0"/>
+        </a:fillRef>
+        <a:effectRef idx="0">
+          <a:scrgbClr r="0" g="0" b="0"/>
+        </a:effectRef>
+        <a:fontRef idx="minor"/>
+      </dsp:style>
+      <dsp:txBody>
+        <a:bodyPr spcFirstLastPara="0" vert="horz" wrap="square" lIns="12700" tIns="0" rIns="12700" bIns="0" numCol="1" spcCol="1270" anchor="ctr" anchorCtr="0">
+          <a:noAutofit/>
+        </a:bodyPr>
+        <a:lstStyle/>
+        <a:p>
+          <a:pPr lvl="0" algn="ctr" defTabSz="222250">
+            <a:lnSpc>
+              <a:spcPct val="90000"/>
+            </a:lnSpc>
+            <a:spcBef>
+              <a:spcPct val="0"/>
+            </a:spcBef>
+            <a:spcAft>
+              <a:spcPct val="35000"/>
+            </a:spcAft>
+          </a:pPr>
+          <a:endParaRPr lang="en-US" sz="500" kern="1200"/>
+        </a:p>
+      </dsp:txBody>
+      <dsp:txXfrm>
+        <a:off x="5368308" y="2355833"/>
+        <a:ext cx="23983" cy="4796"/>
+      </dsp:txXfrm>
+    </dsp:sp>
+    <dsp:sp modelId="{E2B255F3-8F3C-462B-9120-5E58F5701827}">
+      <dsp:nvSpPr>
+        <dsp:cNvPr id="0" name=""/>
+        <dsp:cNvSpPr/>
+      </dsp:nvSpPr>
+      <dsp:spPr>
+        <a:xfrm>
+          <a:off x="3072035" y="1732572"/>
+          <a:ext cx="2085528" cy="1251317"/>
+        </a:xfrm>
+        <a:prstGeom prst="rect">
+          <a:avLst/>
+        </a:prstGeom>
+        <a:solidFill>
+          <a:schemeClr val="accent1">
+            <a:hueOff val="0"/>
+            <a:satOff val="0"/>
+            <a:lumOff val="0"/>
+            <a:alphaOff val="0"/>
+          </a:schemeClr>
+        </a:solidFill>
+        <a:ln w="48000" cap="flat" cmpd="thickThin" algn="ctr">
+          <a:solidFill>
+            <a:schemeClr val="lt1">
+              <a:hueOff val="0"/>
+              <a:satOff val="0"/>
+              <a:lumOff val="0"/>
+              <a:alphaOff val="0"/>
+            </a:schemeClr>
+          </a:solidFill>
+          <a:prstDash val="solid"/>
+        </a:ln>
+        <a:effectLst/>
+      </dsp:spPr>
+      <dsp:style>
+        <a:lnRef idx="2">
+          <a:scrgbClr r="0" g="0" b="0"/>
+        </a:lnRef>
+        <a:fillRef idx="1">
+          <a:scrgbClr r="0" g="0" b="0"/>
+        </a:fillRef>
+        <a:effectRef idx="0">
+          <a:scrgbClr r="0" g="0" b="0"/>
+        </a:effectRef>
+        <a:fontRef idx="minor">
+          <a:schemeClr val="lt1"/>
+        </a:fontRef>
+      </dsp:style>
+      <dsp:txBody>
+        <a:bodyPr spcFirstLastPara="0" vert="horz" wrap="square" lIns="149352" tIns="149352" rIns="149352" bIns="149352" numCol="1" spcCol="1270" anchor="ctr" anchorCtr="0">
+          <a:noAutofit/>
+        </a:bodyPr>
+        <a:lstStyle/>
+        <a:p>
+          <a:pPr lvl="0" algn="ctr" defTabSz="933450">
+            <a:lnSpc>
+              <a:spcPct val="90000"/>
+            </a:lnSpc>
+            <a:spcBef>
+              <a:spcPct val="0"/>
+            </a:spcBef>
+            <a:spcAft>
+              <a:spcPct val="35000"/>
+            </a:spcAft>
+          </a:pPr>
+          <a:r>
+            <a:rPr lang="en-US" sz="2100" kern="1200" dirty="0" smtClean="0"/>
+            <a:t>Test clusters with existing categories</a:t>
+          </a:r>
+          <a:endParaRPr lang="en-US" sz="2100" kern="1200" dirty="0"/>
+        </a:p>
+      </dsp:txBody>
+      <dsp:txXfrm>
+        <a:off x="3072035" y="1732572"/>
+        <a:ext cx="2085528" cy="1251317"/>
+      </dsp:txXfrm>
+    </dsp:sp>
+    <dsp:sp modelId="{8461EAE7-B75C-4384-B225-2573E43AF67A}">
+      <dsp:nvSpPr>
+        <dsp:cNvPr id="0" name=""/>
+        <dsp:cNvSpPr/>
+      </dsp:nvSpPr>
+      <dsp:spPr>
+        <a:xfrm>
+          <a:off x="4114799" y="2982090"/>
+          <a:ext cx="2565200" cy="329145"/>
+        </a:xfrm>
+        <a:custGeom>
+          <a:avLst/>
+          <a:gdLst/>
+          <a:ahLst/>
+          <a:cxnLst/>
+          <a:rect l="0" t="0" r="0" b="0"/>
+          <a:pathLst>
+            <a:path>
+              <a:moveTo>
+                <a:pt x="2565200" y="0"/>
+              </a:moveTo>
+              <a:lnTo>
+                <a:pt x="2565200" y="181672"/>
+              </a:lnTo>
+              <a:lnTo>
+                <a:pt x="0" y="181672"/>
+              </a:lnTo>
+              <a:lnTo>
+                <a:pt x="0" y="329145"/>
+              </a:lnTo>
+            </a:path>
+          </a:pathLst>
+        </a:custGeom>
+        <a:noFill/>
+        <a:ln w="6350" cap="rnd" cmpd="sng" algn="ctr">
+          <a:solidFill>
+            <a:scrgbClr r="0" g="0" b="0">
+              <a:shade val="95000"/>
+              <a:satMod val="105000"/>
+            </a:scrgbClr>
+          </a:solidFill>
+          <a:prstDash val="dashDot"/>
+          <a:tailEnd type="arrow"/>
+        </a:ln>
+        <a:effectLst/>
+      </dsp:spPr>
+      <dsp:style>
+        <a:lnRef idx="1">
+          <a:scrgbClr r="0" g="0" b="0"/>
+        </a:lnRef>
+        <a:fillRef idx="0">
+          <a:scrgbClr r="0" g="0" b="0"/>
+        </a:fillRef>
+        <a:effectRef idx="0">
+          <a:scrgbClr r="0" g="0" b="0"/>
+        </a:effectRef>
+        <a:fontRef idx="minor"/>
+      </dsp:style>
+      <dsp:txBody>
+        <a:bodyPr spcFirstLastPara="0" vert="horz" wrap="square" lIns="12700" tIns="0" rIns="12700" bIns="0" numCol="1" spcCol="1270" anchor="ctr" anchorCtr="0">
+          <a:noAutofit/>
+        </a:bodyPr>
+        <a:lstStyle/>
+        <a:p>
+          <a:pPr lvl="0" algn="ctr" defTabSz="222250">
+            <a:lnSpc>
+              <a:spcPct val="90000"/>
+            </a:lnSpc>
+            <a:spcBef>
+              <a:spcPct val="0"/>
+            </a:spcBef>
+            <a:spcAft>
+              <a:spcPct val="35000"/>
+            </a:spcAft>
+          </a:pPr>
+          <a:endParaRPr lang="en-US" sz="500" kern="1200"/>
+        </a:p>
+      </dsp:txBody>
+      <dsp:txXfrm>
+        <a:off x="5332642" y="3144264"/>
+        <a:ext cx="129515" cy="4796"/>
+      </dsp:txXfrm>
+    </dsp:sp>
+    <dsp:sp modelId="{BB41F561-C362-4AB7-B8BE-32B9060FFCAD}">
+      <dsp:nvSpPr>
+        <dsp:cNvPr id="0" name=""/>
+        <dsp:cNvSpPr/>
+      </dsp:nvSpPr>
+      <dsp:spPr>
+        <a:xfrm>
+          <a:off x="5637235" y="1732572"/>
+          <a:ext cx="2085528" cy="1251317"/>
+        </a:xfrm>
+        <a:prstGeom prst="rect">
+          <a:avLst/>
+        </a:prstGeom>
+        <a:solidFill>
+          <a:schemeClr val="accent1">
+            <a:hueOff val="0"/>
+            <a:satOff val="0"/>
+            <a:lumOff val="0"/>
+            <a:alphaOff val="0"/>
+          </a:schemeClr>
+        </a:solidFill>
+        <a:ln w="48000" cap="flat" cmpd="thickThin" algn="ctr">
+          <a:solidFill>
+            <a:schemeClr val="lt1">
+              <a:hueOff val="0"/>
+              <a:satOff val="0"/>
+              <a:lumOff val="0"/>
+              <a:alphaOff val="0"/>
+            </a:schemeClr>
+          </a:solidFill>
+          <a:prstDash val="solid"/>
+        </a:ln>
+        <a:effectLst/>
+      </dsp:spPr>
+      <dsp:style>
+        <a:lnRef idx="2">
+          <a:scrgbClr r="0" g="0" b="0"/>
+        </a:lnRef>
+        <a:fillRef idx="1">
+          <a:scrgbClr r="0" g="0" b="0"/>
+        </a:fillRef>
+        <a:effectRef idx="0">
+          <a:scrgbClr r="0" g="0" b="0"/>
+        </a:effectRef>
+        <a:fontRef idx="minor">
+          <a:schemeClr val="lt1"/>
+        </a:fontRef>
+      </dsp:style>
+      <dsp:txBody>
+        <a:bodyPr spcFirstLastPara="0" vert="horz" wrap="square" lIns="149352" tIns="149352" rIns="149352" bIns="149352" numCol="1" spcCol="1270" anchor="ctr" anchorCtr="0">
+          <a:noAutofit/>
+        </a:bodyPr>
+        <a:lstStyle/>
+        <a:p>
+          <a:pPr lvl="0" algn="ctr" defTabSz="933450">
+            <a:lnSpc>
+              <a:spcPct val="90000"/>
+            </a:lnSpc>
+            <a:spcBef>
+              <a:spcPct val="0"/>
+            </a:spcBef>
+            <a:spcAft>
+              <a:spcPct val="35000"/>
+            </a:spcAft>
+          </a:pPr>
+          <a:r>
+            <a:rPr lang="en-US" sz="2100" kern="1200" dirty="0" smtClean="0"/>
+            <a:t>Share results with internally with team</a:t>
+          </a:r>
+          <a:endParaRPr lang="en-US" sz="2100" kern="1200" dirty="0"/>
+        </a:p>
+      </dsp:txBody>
+      <dsp:txXfrm>
+        <a:off x="5637235" y="1732572"/>
+        <a:ext cx="2085528" cy="1251317"/>
+      </dsp:txXfrm>
+    </dsp:sp>
+    <dsp:sp modelId="{89FF870D-B82F-46A1-8FD9-E056C0E2F438}">
+      <dsp:nvSpPr>
+        <dsp:cNvPr id="0" name=""/>
+        <dsp:cNvSpPr/>
+      </dsp:nvSpPr>
+      <dsp:spPr>
+        <a:xfrm>
+          <a:off x="3072035" y="3343635"/>
+          <a:ext cx="2085528" cy="1251317"/>
+        </a:xfrm>
+        <a:prstGeom prst="rect">
+          <a:avLst/>
+        </a:prstGeom>
+        <a:solidFill>
+          <a:schemeClr val="accent1">
+            <a:hueOff val="0"/>
+            <a:satOff val="0"/>
+            <a:lumOff val="0"/>
+            <a:alphaOff val="0"/>
+          </a:schemeClr>
+        </a:solidFill>
+        <a:ln w="48000" cap="flat" cmpd="thickThin" algn="ctr">
+          <a:solidFill>
+            <a:schemeClr val="lt1">
+              <a:hueOff val="0"/>
+              <a:satOff val="0"/>
+              <a:lumOff val="0"/>
+              <a:alphaOff val="0"/>
+            </a:schemeClr>
+          </a:solidFill>
+          <a:prstDash val="solid"/>
+        </a:ln>
+        <a:effectLst/>
+      </dsp:spPr>
+      <dsp:style>
+        <a:lnRef idx="2">
+          <a:scrgbClr r="0" g="0" b="0"/>
+        </a:lnRef>
+        <a:fillRef idx="1">
+          <a:scrgbClr r="0" g="0" b="0"/>
+        </a:fillRef>
+        <a:effectRef idx="0">
+          <a:scrgbClr r="0" g="0" b="0"/>
+        </a:effectRef>
+        <a:fontRef idx="minor">
+          <a:schemeClr val="lt1"/>
+        </a:fontRef>
+      </dsp:style>
+      <dsp:txBody>
+        <a:bodyPr spcFirstLastPara="0" vert="horz" wrap="square" lIns="149352" tIns="149352" rIns="149352" bIns="149352" numCol="1" spcCol="1270" anchor="ctr" anchorCtr="0">
+          <a:noAutofit/>
+        </a:bodyPr>
+        <a:lstStyle/>
+        <a:p>
+          <a:pPr lvl="0" algn="ctr" defTabSz="933450">
+            <a:lnSpc>
+              <a:spcPct val="90000"/>
+            </a:lnSpc>
+            <a:spcBef>
+              <a:spcPct val="0"/>
+            </a:spcBef>
+            <a:spcAft>
+              <a:spcPct val="35000"/>
+            </a:spcAft>
+          </a:pPr>
+          <a:r>
+            <a:rPr lang="en-US" sz="2100" kern="1200" dirty="0" smtClean="0"/>
+            <a:t>Disseminate results to other stakeholders</a:t>
+          </a:r>
+          <a:endParaRPr lang="en-US" sz="2100" kern="1200" dirty="0"/>
+        </a:p>
+      </dsp:txBody>
+      <dsp:txXfrm>
+        <a:off x="3072035" y="3343635"/>
+        <a:ext cx="2085528" cy="1251317"/>
+      </dsp:txXfrm>
+    </dsp:sp>
   </dsp:spTree>
 </dsp:drawing>
 </file>
@@ -5399,7 +6437,7 @@
             <a:fld id="{CC16B254-F755-154D-86D8-705F3C585905}" type="datetimeFigureOut">
               <a:rPr lang="en-US" smtClean="0"/>
               <a:pPr/>
-              <a:t>07/31/2018</a:t>
+              <a:t>08/21/2018</a:t>
             </a:fld>
             <a:endParaRPr lang="en-US"/>
           </a:p>
@@ -5567,7 +6605,7 @@
             <a:fld id="{70242358-85E2-2545-8677-79B1E11E6ECD}" type="datetimeFigureOut">
               <a:rPr lang="en-US" smtClean="0"/>
               <a:pPr/>
-              <a:t>07/31/2018</a:t>
+              <a:t>08/21/2018</a:t>
             </a:fld>
             <a:endParaRPr lang="en-US"/>
           </a:p>
@@ -10020,9 +11058,36 @@
           </a:p>
         </p:txBody>
       </p:sp>
+      <p:sp>
+        <p:nvSpPr>
+          <p:cNvPr id="4" name="Title 3"/>
+          <p:cNvSpPr>
+            <a:spLocks noGrp="1"/>
+          </p:cNvSpPr>
+          <p:nvPr>
+            <p:ph type="title"/>
+          </p:nvPr>
+        </p:nvSpPr>
+        <p:spPr/>
+        <p:txBody>
+          <a:bodyPr/>
+          <a:lstStyle/>
+          <a:p>
+            <a:r>
+              <a:rPr lang="en-US" dirty="0"/>
+              <a:t>k</a:t>
+            </a:r>
+            <a:r>
+              <a:rPr lang="en-US" dirty="0" smtClean="0"/>
+              <a:t>-modes Clusters</a:t>
+            </a:r>
+            <a:endParaRPr lang="en-US" dirty="0"/>
+          </a:p>
+        </p:txBody>
+      </p:sp>
       <p:pic>
         <p:nvPicPr>
-          <p:cNvPr id="5" name="Content Placeholder 4"/>
+          <p:cNvPr id="6" name="Content Placeholder 5"/>
           <p:cNvPicPr>
             <a:picLocks noGrp="1" noChangeAspect="1"/>
           </p:cNvPicPr>
@@ -10044,38 +11109,11 @@
         </p:blipFill>
         <p:spPr>
           <a:xfrm>
-            <a:off x="1578352" y="1693888"/>
-            <a:ext cx="6459278" cy="4152276"/>
+            <a:off x="840080" y="1828800"/>
+            <a:ext cx="7463840" cy="4297363"/>
           </a:xfrm>
         </p:spPr>
       </p:pic>
-      <p:sp>
-        <p:nvSpPr>
-          <p:cNvPr id="4" name="Title 3"/>
-          <p:cNvSpPr>
-            <a:spLocks noGrp="1"/>
-          </p:cNvSpPr>
-          <p:nvPr>
-            <p:ph type="title"/>
-          </p:nvPr>
-        </p:nvSpPr>
-        <p:spPr/>
-        <p:txBody>
-          <a:bodyPr/>
-          <a:lstStyle/>
-          <a:p>
-            <a:r>
-              <a:rPr lang="en-US" dirty="0"/>
-              <a:t>k</a:t>
-            </a:r>
-            <a:r>
-              <a:rPr lang="en-US" dirty="0" smtClean="0"/>
-              <a:t>-modes Clusters</a:t>
-            </a:r>
-            <a:endParaRPr lang="en-US" dirty="0"/>
-          </a:p>
-        </p:txBody>
-      </p:sp>
     </p:spTree>
     <p:extLst>
       <p:ext uri="{BB962C8B-B14F-4D97-AF65-F5344CB8AC3E}">

</xml_diff>